<commit_message>
Accessibility Changes to pptx
</commit_message>
<xml_diff>
--- a/webdevmojo.pptx
+++ b/webdevmojo.pptx
@@ -123,7 +123,7 @@
   </p:defaultTextStyle>
   <p:extLst>
     <p:ext uri="{EFAFB233-063F-42B5-8137-9DF3F51BA10A}">
-      <p15:sldGuideLst xmlns:p15="http://schemas.microsoft.com/office/powerpoint/2012/main" xmlns="">
+      <p15:sldGuideLst xmlns="" xmlns:p15="http://schemas.microsoft.com/office/powerpoint/2012/main">
         <p15:guide id="1" orient="horz" pos="2160">
           <p15:clr>
             <a:srgbClr val="A4A3A4"/>
@@ -322,7 +322,7 @@
             <a:fld id="{1D8BD707-D9CF-40AE-B4C6-C98DA3205C09}" type="datetimeFigureOut">
               <a:rPr lang="en-US" smtClean="0"/>
               <a:pPr/>
-              <a:t>11/04/2014</a:t>
+              <a:t>11/12/2014</a:t>
             </a:fld>
             <a:endParaRPr lang="en-US"/>
           </a:p>
@@ -489,7 +489,7 @@
             <a:fld id="{1D8BD707-D9CF-40AE-B4C6-C98DA3205C09}" type="datetimeFigureOut">
               <a:rPr lang="en-US" smtClean="0"/>
               <a:pPr/>
-              <a:t>11/04/2014</a:t>
+              <a:t>11/12/2014</a:t>
             </a:fld>
             <a:endParaRPr lang="en-US"/>
           </a:p>
@@ -666,7 +666,7 @@
             <a:fld id="{1D8BD707-D9CF-40AE-B4C6-C98DA3205C09}" type="datetimeFigureOut">
               <a:rPr lang="en-US" smtClean="0"/>
               <a:pPr/>
-              <a:t>11/04/2014</a:t>
+              <a:t>11/12/2014</a:t>
             </a:fld>
             <a:endParaRPr lang="en-US"/>
           </a:p>
@@ -833,7 +833,7 @@
             <a:fld id="{1D8BD707-D9CF-40AE-B4C6-C98DA3205C09}" type="datetimeFigureOut">
               <a:rPr lang="en-US" smtClean="0"/>
               <a:pPr/>
-              <a:t>11/04/2014</a:t>
+              <a:t>11/12/2014</a:t>
             </a:fld>
             <a:endParaRPr lang="en-US"/>
           </a:p>
@@ -1076,7 +1076,7 @@
             <a:fld id="{1D8BD707-D9CF-40AE-B4C6-C98DA3205C09}" type="datetimeFigureOut">
               <a:rPr lang="en-US" smtClean="0"/>
               <a:pPr/>
-              <a:t>11/04/2014</a:t>
+              <a:t>11/12/2014</a:t>
             </a:fld>
             <a:endParaRPr lang="en-US"/>
           </a:p>
@@ -1361,7 +1361,7 @@
             <a:fld id="{1D8BD707-D9CF-40AE-B4C6-C98DA3205C09}" type="datetimeFigureOut">
               <a:rPr lang="en-US" smtClean="0"/>
               <a:pPr/>
-              <a:t>11/04/2014</a:t>
+              <a:t>11/12/2014</a:t>
             </a:fld>
             <a:endParaRPr lang="en-US"/>
           </a:p>
@@ -1780,7 +1780,7 @@
             <a:fld id="{1D8BD707-D9CF-40AE-B4C6-C98DA3205C09}" type="datetimeFigureOut">
               <a:rPr lang="en-US" smtClean="0"/>
               <a:pPr/>
-              <a:t>11/04/2014</a:t>
+              <a:t>11/12/2014</a:t>
             </a:fld>
             <a:endParaRPr lang="en-US"/>
           </a:p>
@@ -1895,7 +1895,7 @@
             <a:fld id="{1D8BD707-D9CF-40AE-B4C6-C98DA3205C09}" type="datetimeFigureOut">
               <a:rPr lang="en-US" smtClean="0"/>
               <a:pPr/>
-              <a:t>11/04/2014</a:t>
+              <a:t>11/12/2014</a:t>
             </a:fld>
             <a:endParaRPr lang="en-US"/>
           </a:p>
@@ -1987,7 +1987,7 @@
             <a:fld id="{1D8BD707-D9CF-40AE-B4C6-C98DA3205C09}" type="datetimeFigureOut">
               <a:rPr lang="en-US" smtClean="0"/>
               <a:pPr/>
-              <a:t>11/04/2014</a:t>
+              <a:t>11/12/2014</a:t>
             </a:fld>
             <a:endParaRPr lang="en-US"/>
           </a:p>
@@ -2261,7 +2261,7 @@
             <a:fld id="{1D8BD707-D9CF-40AE-B4C6-C98DA3205C09}" type="datetimeFigureOut">
               <a:rPr lang="en-US" smtClean="0"/>
               <a:pPr/>
-              <a:t>11/04/2014</a:t>
+              <a:t>11/12/2014</a:t>
             </a:fld>
             <a:endParaRPr lang="en-US"/>
           </a:p>
@@ -2511,7 +2511,7 @@
             <a:fld id="{1D8BD707-D9CF-40AE-B4C6-C98DA3205C09}" type="datetimeFigureOut">
               <a:rPr lang="en-US" smtClean="0"/>
               <a:pPr/>
-              <a:t>11/04/2014</a:t>
+              <a:t>11/12/2014</a:t>
             </a:fld>
             <a:endParaRPr lang="en-US"/>
           </a:p>
@@ -2721,7 +2721,7 @@
             <a:fld id="{1D8BD707-D9CF-40AE-B4C6-C98DA3205C09}" type="datetimeFigureOut">
               <a:rPr lang="en-US" smtClean="0"/>
               <a:pPr/>
-              <a:t>11/04/2014</a:t>
+              <a:t>11/12/2014</a:t>
             </a:fld>
             <a:endParaRPr lang="en-US"/>
           </a:p>
@@ -3100,7 +3100,7 @@
         </p:nvSpPr>
         <p:spPr>
           <a:xfrm>
-            <a:off x="533400" y="456534"/>
+            <a:off x="381000" y="381000"/>
             <a:ext cx="8001000" cy="6093976"/>
           </a:xfrm>
           <a:prstGeom prst="rect">
@@ -3268,6 +3268,48 @@
             <a:endParaRPr lang="en-US" dirty="0"/>
           </a:p>
           <a:p>
+            <a:endParaRPr lang="en-US" dirty="0"/>
+          </a:p>
+        </p:txBody>
+      </p:sp>
+      <p:sp>
+        <p:nvSpPr>
+          <p:cNvPr id="2" name="Title 1" hidden="1"/>
+          <p:cNvSpPr>
+            <a:spLocks noGrp="1"/>
+          </p:cNvSpPr>
+          <p:nvPr>
+            <p:ph type="ctrTitle"/>
+          </p:nvPr>
+        </p:nvSpPr>
+        <p:spPr>
+          <a:xfrm>
+            <a:off x="990600" y="1524000"/>
+            <a:ext cx="7772400" cy="1470025"/>
+          </a:xfrm>
+        </p:spPr>
+        <p:txBody>
+          <a:bodyPr>
+            <a:normAutofit fontScale="90000"/>
+          </a:bodyPr>
+          <a:lstStyle/>
+          <a:p>
+            <a:r>
+              <a:rPr lang="en-US" dirty="0"/>
+              <a:t>Got a CMS? Get Your </a:t>
+            </a:r>
+            <a:r>
+              <a:rPr lang="en-US" dirty="0" err="1"/>
+              <a:t>Webdevmojo</a:t>
+            </a:r>
+            <a:r>
+              <a:rPr lang="en-US" dirty="0"/>
+              <a:t> Back with JavaScript</a:t>
+            </a:r>
+            <a:r>
+              <a:rPr lang="en-US" dirty="0" smtClean="0"/>
+              <a:t>!</a:t>
+            </a:r>
             <a:endParaRPr lang="en-US" dirty="0"/>
           </a:p>
         </p:txBody>
@@ -3311,39 +3353,6 @@
       </p:grpSpPr>
       <p:sp>
         <p:nvSpPr>
-          <p:cNvPr id="2" name="Title 1"/>
-          <p:cNvSpPr>
-            <a:spLocks noGrp="1"/>
-          </p:cNvSpPr>
-          <p:nvPr>
-            <p:ph type="title"/>
-          </p:nvPr>
-        </p:nvSpPr>
-        <p:spPr/>
-        <p:txBody>
-          <a:bodyPr>
-            <a:normAutofit fontScale="90000"/>
-          </a:bodyPr>
-          <a:lstStyle/>
-          <a:p>
-            <a:r>
-              <a:rPr lang="en-US" dirty="0" smtClean="0"/>
-              <a:t>How do you “play </a:t>
-            </a:r>
-            <a:r>
-              <a:rPr lang="en-US" dirty="0" smtClean="0"/>
-              <a:t>well with </a:t>
-            </a:r>
-            <a:r>
-              <a:rPr lang="en-US" dirty="0" smtClean="0"/>
-              <a:t>others?”</a:t>
-            </a:r>
-            <a:endParaRPr lang="en-US" dirty="0"/>
-          </a:p>
-        </p:txBody>
-      </p:sp>
-      <p:sp>
-        <p:nvSpPr>
           <p:cNvPr id="3" name="TextBox 2"/>
           <p:cNvSpPr txBox="1"/>
           <p:nvPr/>
@@ -3409,6 +3418,31 @@
               <a:buChar char="•"/>
             </a:pPr>
             <a:endParaRPr lang="en-US" baseline="-25000" dirty="0"/>
+          </a:p>
+        </p:txBody>
+      </p:sp>
+      <p:sp>
+        <p:nvSpPr>
+          <p:cNvPr id="2" name="Title 1"/>
+          <p:cNvSpPr>
+            <a:spLocks noGrp="1"/>
+          </p:cNvSpPr>
+          <p:nvPr>
+            <p:ph type="title"/>
+          </p:nvPr>
+        </p:nvSpPr>
+        <p:spPr/>
+        <p:txBody>
+          <a:bodyPr>
+            <a:normAutofit fontScale="90000"/>
+          </a:bodyPr>
+          <a:lstStyle/>
+          <a:p>
+            <a:r>
+              <a:rPr lang="en-US" dirty="0" smtClean="0"/>
+              <a:t>How do you “play well with others?”</a:t>
+            </a:r>
+            <a:endParaRPr lang="en-US" dirty="0"/>
           </a:p>
         </p:txBody>
       </p:sp>
@@ -3988,15 +4022,7 @@
           <a:p>
             <a:r>
               <a:rPr lang="en-US" dirty="0" smtClean="0"/>
-              <a:t>How do you “play </a:t>
-            </a:r>
-            <a:r>
-              <a:rPr lang="en-US" dirty="0" smtClean="0"/>
-              <a:t>well with </a:t>
-            </a:r>
-            <a:r>
-              <a:rPr lang="en-US" dirty="0" smtClean="0"/>
-              <a:t>others?”</a:t>
+              <a:t>How do you “play well with others?”</a:t>
             </a:r>
             <a:endParaRPr lang="en-US" dirty="0"/>
           </a:p>
@@ -4123,7 +4149,6 @@
               <a:rPr lang="en-US" dirty="0" smtClean="0"/>
               <a:t> </a:t>
             </a:r>
-            <a:endParaRPr lang="en-US" dirty="0" smtClean="0"/>
           </a:p>
           <a:p>
             <a:pPr marL="285750" indent="-285750">
@@ -4454,33 +4479,6 @@
       </p:grpSpPr>
       <p:sp>
         <p:nvSpPr>
-          <p:cNvPr id="2" name="Title 1"/>
-          <p:cNvSpPr>
-            <a:spLocks noGrp="1"/>
-          </p:cNvSpPr>
-          <p:nvPr>
-            <p:ph type="title"/>
-          </p:nvPr>
-        </p:nvSpPr>
-        <p:spPr/>
-        <p:txBody>
-          <a:bodyPr/>
-          <a:lstStyle/>
-          <a:p>
-            <a:r>
-              <a:rPr lang="en-US" dirty="0" smtClean="0"/>
-              <a:t>Losing </a:t>
-            </a:r>
-            <a:r>
-              <a:rPr lang="en-US" dirty="0" smtClean="0"/>
-              <a:t>it?</a:t>
-            </a:r>
-            <a:endParaRPr lang="en-US" dirty="0"/>
-          </a:p>
-        </p:txBody>
-      </p:sp>
-      <p:sp>
-        <p:nvSpPr>
           <p:cNvPr id="3" name="TextBox 2"/>
           <p:cNvSpPr txBox="1"/>
           <p:nvPr/>
@@ -4535,6 +4533,29 @@
           </a:prstGeom>
         </p:spPr>
       </p:pic>
+      <p:sp>
+        <p:nvSpPr>
+          <p:cNvPr id="2" name="Title 1"/>
+          <p:cNvSpPr>
+            <a:spLocks noGrp="1"/>
+          </p:cNvSpPr>
+          <p:nvPr>
+            <p:ph type="title"/>
+          </p:nvPr>
+        </p:nvSpPr>
+        <p:spPr/>
+        <p:txBody>
+          <a:bodyPr/>
+          <a:lstStyle/>
+          <a:p>
+            <a:r>
+              <a:rPr lang="en-US" dirty="0" smtClean="0"/>
+              <a:t>Losing it?</a:t>
+            </a:r>
+            <a:endParaRPr lang="en-US" dirty="0"/>
+          </a:p>
+        </p:txBody>
+      </p:sp>
     </p:spTree>
     <p:extLst>
       <p:ext uri="{BB962C8B-B14F-4D97-AF65-F5344CB8AC3E}">
@@ -4572,29 +4593,6 @@
           <a:chExt cx="0" cy="0"/>
         </a:xfrm>
       </p:grpSpPr>
-      <p:sp>
-        <p:nvSpPr>
-          <p:cNvPr id="2" name="Title 1"/>
-          <p:cNvSpPr>
-            <a:spLocks noGrp="1"/>
-          </p:cNvSpPr>
-          <p:nvPr>
-            <p:ph type="title"/>
-          </p:nvPr>
-        </p:nvSpPr>
-        <p:spPr/>
-        <p:txBody>
-          <a:bodyPr/>
-          <a:lstStyle/>
-          <a:p>
-            <a:r>
-              <a:rPr lang="en-US" dirty="0" smtClean="0"/>
-              <a:t>What is it?</a:t>
-            </a:r>
-            <a:endParaRPr lang="en-US" dirty="0"/>
-          </a:p>
-        </p:txBody>
-      </p:sp>
       <p:sp>
         <p:nvSpPr>
           <p:cNvPr id="3" name="TextBox 2"/>
@@ -4696,6 +4694,29 @@
           </a:extLst>
         </p:spPr>
       </p:pic>
+      <p:sp>
+        <p:nvSpPr>
+          <p:cNvPr id="2" name="Title 1"/>
+          <p:cNvSpPr>
+            <a:spLocks noGrp="1"/>
+          </p:cNvSpPr>
+          <p:nvPr>
+            <p:ph type="title"/>
+          </p:nvPr>
+        </p:nvSpPr>
+        <p:spPr/>
+        <p:txBody>
+          <a:bodyPr/>
+          <a:lstStyle/>
+          <a:p>
+            <a:r>
+              <a:rPr lang="en-US" dirty="0" smtClean="0"/>
+              <a:t>What is it?</a:t>
+            </a:r>
+            <a:endParaRPr lang="en-US" dirty="0"/>
+          </a:p>
+        </p:txBody>
+      </p:sp>
     </p:spTree>
     <p:extLst>
       <p:ext uri="{BB962C8B-B14F-4D97-AF65-F5344CB8AC3E}">
@@ -4735,37 +4756,6 @@
       </p:grpSpPr>
       <p:sp>
         <p:nvSpPr>
-          <p:cNvPr id="2" name="Title 1"/>
-          <p:cNvSpPr>
-            <a:spLocks noGrp="1"/>
-          </p:cNvSpPr>
-          <p:nvPr>
-            <p:ph type="title"/>
-          </p:nvPr>
-        </p:nvSpPr>
-        <p:spPr/>
-        <p:txBody>
-          <a:bodyPr/>
-          <a:lstStyle/>
-          <a:p>
-            <a:r>
-              <a:rPr lang="en-US" dirty="0" smtClean="0"/>
-              <a:t>How do you get </a:t>
-            </a:r>
-            <a:r>
-              <a:rPr lang="en-US" dirty="0" smtClean="0"/>
-              <a:t>it </a:t>
-            </a:r>
-            <a:r>
-              <a:rPr lang="en-US" dirty="0" smtClean="0"/>
-              <a:t>back?</a:t>
-            </a:r>
-            <a:endParaRPr lang="en-US" dirty="0"/>
-          </a:p>
-        </p:txBody>
-      </p:sp>
-      <p:sp>
-        <p:nvSpPr>
           <p:cNvPr id="3" name="TextBox 2"/>
           <p:cNvSpPr txBox="1"/>
           <p:nvPr/>
@@ -4789,6 +4779,29 @@
             <a:r>
               <a:rPr lang="en-US" dirty="0" smtClean="0"/>
               <a:t>Example of Inmate Locator</a:t>
+            </a:r>
+            <a:endParaRPr lang="en-US" dirty="0"/>
+          </a:p>
+        </p:txBody>
+      </p:sp>
+      <p:sp>
+        <p:nvSpPr>
+          <p:cNvPr id="2" name="Title 1"/>
+          <p:cNvSpPr>
+            <a:spLocks noGrp="1"/>
+          </p:cNvSpPr>
+          <p:nvPr>
+            <p:ph type="title"/>
+          </p:nvPr>
+        </p:nvSpPr>
+        <p:spPr/>
+        <p:txBody>
+          <a:bodyPr/>
+          <a:lstStyle/>
+          <a:p>
+            <a:r>
+              <a:rPr lang="en-US" dirty="0" smtClean="0"/>
+              <a:t>How do you get it back?</a:t>
             </a:r>
             <a:endParaRPr lang="en-US" dirty="0"/>
           </a:p>
@@ -4893,33 +4906,6 @@
       </p:grpSpPr>
       <p:sp>
         <p:nvSpPr>
-          <p:cNvPr id="2" name="Title 1"/>
-          <p:cNvSpPr>
-            <a:spLocks noGrp="1"/>
-          </p:cNvSpPr>
-          <p:nvPr>
-            <p:ph type="title"/>
-          </p:nvPr>
-        </p:nvSpPr>
-        <p:spPr/>
-        <p:txBody>
-          <a:bodyPr/>
-          <a:lstStyle/>
-          <a:p>
-            <a:r>
-              <a:rPr lang="en-US" dirty="0" smtClean="0"/>
-              <a:t>How </a:t>
-            </a:r>
-            <a:r>
-              <a:rPr lang="en-US" dirty="0" smtClean="0"/>
-              <a:t>do you play?</a:t>
-            </a:r>
-            <a:endParaRPr lang="en-US" dirty="0"/>
-          </a:p>
-        </p:txBody>
-      </p:sp>
-      <p:sp>
-        <p:nvSpPr>
           <p:cNvPr id="3" name="TextBox 2"/>
           <p:cNvSpPr txBox="1"/>
           <p:nvPr/>
@@ -4971,6 +4957,29 @@
             <a:r>
               <a:rPr lang="en-US" dirty="0" smtClean="0"/>
               <a:t> that loads file from server</a:t>
+            </a:r>
+            <a:endParaRPr lang="en-US" dirty="0"/>
+          </a:p>
+        </p:txBody>
+      </p:sp>
+      <p:sp>
+        <p:nvSpPr>
+          <p:cNvPr id="2" name="Title 1"/>
+          <p:cNvSpPr>
+            <a:spLocks noGrp="1"/>
+          </p:cNvSpPr>
+          <p:nvPr>
+            <p:ph type="title"/>
+          </p:nvPr>
+        </p:nvSpPr>
+        <p:spPr/>
+        <p:txBody>
+          <a:bodyPr/>
+          <a:lstStyle/>
+          <a:p>
+            <a:r>
+              <a:rPr lang="en-US" dirty="0" smtClean="0"/>
+              <a:t>How do you play?</a:t>
             </a:r>
             <a:endParaRPr lang="en-US" dirty="0"/>
           </a:p>
@@ -5015,29 +5024,6 @@
       </p:grpSpPr>
       <p:sp>
         <p:nvSpPr>
-          <p:cNvPr id="2" name="Title 1"/>
-          <p:cNvSpPr>
-            <a:spLocks noGrp="1"/>
-          </p:cNvSpPr>
-          <p:nvPr>
-            <p:ph type="title"/>
-          </p:nvPr>
-        </p:nvSpPr>
-        <p:spPr/>
-        <p:txBody>
-          <a:bodyPr/>
-          <a:lstStyle/>
-          <a:p>
-            <a:r>
-              <a:rPr lang="en-US" dirty="0" smtClean="0"/>
-              <a:t>Can you play?</a:t>
-            </a:r>
-            <a:endParaRPr lang="en-US" dirty="0"/>
-          </a:p>
-        </p:txBody>
-      </p:sp>
-      <p:sp>
-        <p:nvSpPr>
           <p:cNvPr id="3" name="TextBox 2"/>
           <p:cNvSpPr txBox="1"/>
           <p:nvPr/>
@@ -5119,6 +5105,29 @@
               <a:rPr lang="en-US" dirty="0" smtClean="0"/>
               <a:t>Does it display</a:t>
             </a:r>
+          </a:p>
+        </p:txBody>
+      </p:sp>
+      <p:sp>
+        <p:nvSpPr>
+          <p:cNvPr id="2" name="Title 1"/>
+          <p:cNvSpPr>
+            <a:spLocks noGrp="1"/>
+          </p:cNvSpPr>
+          <p:nvPr>
+            <p:ph type="title"/>
+          </p:nvPr>
+        </p:nvSpPr>
+        <p:spPr/>
+        <p:txBody>
+          <a:bodyPr/>
+          <a:lstStyle/>
+          <a:p>
+            <a:r>
+              <a:rPr lang="en-US" dirty="0" smtClean="0"/>
+              <a:t>Can you play?</a:t>
+            </a:r>
+            <a:endParaRPr lang="en-US" dirty="0"/>
           </a:p>
         </p:txBody>
       </p:sp>
@@ -5154,29 +5163,6 @@
       </p:grpSpPr>
       <p:sp>
         <p:nvSpPr>
-          <p:cNvPr id="2" name="Title 1"/>
-          <p:cNvSpPr>
-            <a:spLocks noGrp="1"/>
-          </p:cNvSpPr>
-          <p:nvPr>
-            <p:ph type="title"/>
-          </p:nvPr>
-        </p:nvSpPr>
-        <p:spPr/>
-        <p:txBody>
-          <a:bodyPr/>
-          <a:lstStyle/>
-          <a:p>
-            <a:r>
-              <a:rPr lang="en-US" dirty="0" smtClean="0"/>
-              <a:t>Why can’t you play?</a:t>
-            </a:r>
-            <a:endParaRPr lang="en-US" dirty="0"/>
-          </a:p>
-        </p:txBody>
-      </p:sp>
-      <p:sp>
-        <p:nvSpPr>
           <p:cNvPr id="3" name="TextBox 2"/>
           <p:cNvSpPr txBox="1"/>
           <p:nvPr/>
@@ -5218,6 +5204,29 @@
             <a:r>
               <a:rPr lang="en-US" dirty="0" smtClean="0"/>
               <a:t>Too complicated</a:t>
+            </a:r>
+            <a:endParaRPr lang="en-US" dirty="0"/>
+          </a:p>
+        </p:txBody>
+      </p:sp>
+      <p:sp>
+        <p:nvSpPr>
+          <p:cNvPr id="2" name="Title 1"/>
+          <p:cNvSpPr>
+            <a:spLocks noGrp="1"/>
+          </p:cNvSpPr>
+          <p:nvPr>
+            <p:ph type="title"/>
+          </p:nvPr>
+        </p:nvSpPr>
+        <p:spPr/>
+        <p:txBody>
+          <a:bodyPr/>
+          <a:lstStyle/>
+          <a:p>
+            <a:r>
+              <a:rPr lang="en-US" dirty="0" smtClean="0"/>
+              <a:t>Why can’t you play?</a:t>
             </a:r>
             <a:endParaRPr lang="en-US" dirty="0"/>
           </a:p>
@@ -5255,43 +5264,6 @@
       </p:grpSpPr>
       <p:sp>
         <p:nvSpPr>
-          <p:cNvPr id="2" name="Title 1"/>
-          <p:cNvSpPr>
-            <a:spLocks noGrp="1"/>
-          </p:cNvSpPr>
-          <p:nvPr>
-            <p:ph type="title"/>
-          </p:nvPr>
-        </p:nvSpPr>
-        <p:spPr/>
-        <p:txBody>
-          <a:bodyPr>
-            <a:normAutofit/>
-          </a:bodyPr>
-          <a:lstStyle/>
-          <a:p>
-            <a:r>
-              <a:rPr lang="en-US" dirty="0" smtClean="0"/>
-              <a:t>What </a:t>
-            </a:r>
-            <a:r>
-              <a:rPr lang="en-US" dirty="0" smtClean="0"/>
-              <a:t>do you have to </a:t>
-            </a:r>
-            <a:r>
-              <a:rPr lang="en-US" dirty="0" smtClean="0"/>
-              <a:t>play with</a:t>
-            </a:r>
-            <a:r>
-              <a:rPr lang="en-US" dirty="0" smtClean="0"/>
-              <a:t>?</a:t>
-            </a:r>
-            <a:endParaRPr lang="en-US" dirty="0"/>
-          </a:p>
-        </p:txBody>
-      </p:sp>
-      <p:sp>
-        <p:nvSpPr>
           <p:cNvPr id="3" name="TextBox 2"/>
           <p:cNvSpPr txBox="1"/>
           <p:nvPr/>
@@ -5327,6 +5299,31 @@
             <a:r>
               <a:rPr lang="en-US" dirty="0" smtClean="0"/>
               <a:t>Libraries (jQuery)</a:t>
+            </a:r>
+            <a:endParaRPr lang="en-US" dirty="0"/>
+          </a:p>
+        </p:txBody>
+      </p:sp>
+      <p:sp>
+        <p:nvSpPr>
+          <p:cNvPr id="2" name="Title 1"/>
+          <p:cNvSpPr>
+            <a:spLocks noGrp="1"/>
+          </p:cNvSpPr>
+          <p:nvPr>
+            <p:ph type="title"/>
+          </p:nvPr>
+        </p:nvSpPr>
+        <p:spPr/>
+        <p:txBody>
+          <a:bodyPr>
+            <a:normAutofit/>
+          </a:bodyPr>
+          <a:lstStyle/>
+          <a:p>
+            <a:r>
+              <a:rPr lang="en-US" dirty="0" smtClean="0"/>
+              <a:t>What do you have to play with?</a:t>
             </a:r>
             <a:endParaRPr lang="en-US" dirty="0"/>
           </a:p>

</xml_diff>

<commit_message>
Added demo references, sample code files
</commit_message>
<xml_diff>
--- a/webdevmojo.pptx
+++ b/webdevmojo.pptx
@@ -8,21 +8,25 @@
     <p:sldId id="256" r:id="rId2"/>
     <p:sldId id="257" r:id="rId3"/>
     <p:sldId id="262" r:id="rId4"/>
-    <p:sldId id="258" r:id="rId5"/>
-    <p:sldId id="259" r:id="rId6"/>
-    <p:sldId id="260" r:id="rId7"/>
-    <p:sldId id="261" r:id="rId8"/>
-    <p:sldId id="263" r:id="rId9"/>
-    <p:sldId id="264" r:id="rId10"/>
-    <p:sldId id="268" r:id="rId11"/>
-    <p:sldId id="272" r:id="rId12"/>
-    <p:sldId id="270" r:id="rId13"/>
-    <p:sldId id="271" r:id="rId14"/>
-    <p:sldId id="273" r:id="rId15"/>
-    <p:sldId id="269" r:id="rId16"/>
-    <p:sldId id="267" r:id="rId17"/>
-    <p:sldId id="265" r:id="rId18"/>
-    <p:sldId id="266" r:id="rId19"/>
+    <p:sldId id="275" r:id="rId5"/>
+    <p:sldId id="274" r:id="rId6"/>
+    <p:sldId id="258" r:id="rId7"/>
+    <p:sldId id="259" r:id="rId8"/>
+    <p:sldId id="260" r:id="rId9"/>
+    <p:sldId id="261" r:id="rId10"/>
+    <p:sldId id="263" r:id="rId11"/>
+    <p:sldId id="276" r:id="rId12"/>
+    <p:sldId id="264" r:id="rId13"/>
+    <p:sldId id="268" r:id="rId14"/>
+    <p:sldId id="277" r:id="rId15"/>
+    <p:sldId id="272" r:id="rId16"/>
+    <p:sldId id="270" r:id="rId17"/>
+    <p:sldId id="271" r:id="rId18"/>
+    <p:sldId id="273" r:id="rId19"/>
+    <p:sldId id="269" r:id="rId20"/>
+    <p:sldId id="267" r:id="rId21"/>
+    <p:sldId id="265" r:id="rId22"/>
+    <p:sldId id="266" r:id="rId23"/>
   </p:sldIdLst>
   <p:sldSz cx="9144000" cy="6858000" type="screen4x3"/>
   <p:notesSz cx="6858000" cy="9144000"/>
@@ -123,7 +127,7 @@
   </p:defaultTextStyle>
   <p:extLst>
     <p:ext uri="{EFAFB233-063F-42B5-8137-9DF3F51BA10A}">
-      <p15:sldGuideLst xmlns="" xmlns:p15="http://schemas.microsoft.com/office/powerpoint/2012/main">
+      <p15:sldGuideLst xmlns:p15="http://schemas.microsoft.com/office/powerpoint/2012/main">
         <p15:guide id="1" orient="horz" pos="2160">
           <p15:clr>
             <a:srgbClr val="A4A3A4"/>
@@ -322,7 +326,7 @@
             <a:fld id="{1D8BD707-D9CF-40AE-B4C6-C98DA3205C09}" type="datetimeFigureOut">
               <a:rPr lang="en-US" smtClean="0"/>
               <a:pPr/>
-              <a:t>11/12/2014</a:t>
+              <a:t>11/17/2014</a:t>
             </a:fld>
             <a:endParaRPr lang="en-US"/>
           </a:p>
@@ -489,7 +493,7 @@
             <a:fld id="{1D8BD707-D9CF-40AE-B4C6-C98DA3205C09}" type="datetimeFigureOut">
               <a:rPr lang="en-US" smtClean="0"/>
               <a:pPr/>
-              <a:t>11/12/2014</a:t>
+              <a:t>11/17/2014</a:t>
             </a:fld>
             <a:endParaRPr lang="en-US"/>
           </a:p>
@@ -666,7 +670,7 @@
             <a:fld id="{1D8BD707-D9CF-40AE-B4C6-C98DA3205C09}" type="datetimeFigureOut">
               <a:rPr lang="en-US" smtClean="0"/>
               <a:pPr/>
-              <a:t>11/12/2014</a:t>
+              <a:t>11/17/2014</a:t>
             </a:fld>
             <a:endParaRPr lang="en-US"/>
           </a:p>
@@ -833,7 +837,7 @@
             <a:fld id="{1D8BD707-D9CF-40AE-B4C6-C98DA3205C09}" type="datetimeFigureOut">
               <a:rPr lang="en-US" smtClean="0"/>
               <a:pPr/>
-              <a:t>11/12/2014</a:t>
+              <a:t>11/17/2014</a:t>
             </a:fld>
             <a:endParaRPr lang="en-US"/>
           </a:p>
@@ -1076,7 +1080,7 @@
             <a:fld id="{1D8BD707-D9CF-40AE-B4C6-C98DA3205C09}" type="datetimeFigureOut">
               <a:rPr lang="en-US" smtClean="0"/>
               <a:pPr/>
-              <a:t>11/12/2014</a:t>
+              <a:t>11/17/2014</a:t>
             </a:fld>
             <a:endParaRPr lang="en-US"/>
           </a:p>
@@ -1361,7 +1365,7 @@
             <a:fld id="{1D8BD707-D9CF-40AE-B4C6-C98DA3205C09}" type="datetimeFigureOut">
               <a:rPr lang="en-US" smtClean="0"/>
               <a:pPr/>
-              <a:t>11/12/2014</a:t>
+              <a:t>11/17/2014</a:t>
             </a:fld>
             <a:endParaRPr lang="en-US"/>
           </a:p>
@@ -1780,7 +1784,7 @@
             <a:fld id="{1D8BD707-D9CF-40AE-B4C6-C98DA3205C09}" type="datetimeFigureOut">
               <a:rPr lang="en-US" smtClean="0"/>
               <a:pPr/>
-              <a:t>11/12/2014</a:t>
+              <a:t>11/17/2014</a:t>
             </a:fld>
             <a:endParaRPr lang="en-US"/>
           </a:p>
@@ -1895,7 +1899,7 @@
             <a:fld id="{1D8BD707-D9CF-40AE-B4C6-C98DA3205C09}" type="datetimeFigureOut">
               <a:rPr lang="en-US" smtClean="0"/>
               <a:pPr/>
-              <a:t>11/12/2014</a:t>
+              <a:t>11/17/2014</a:t>
             </a:fld>
             <a:endParaRPr lang="en-US"/>
           </a:p>
@@ -1987,7 +1991,7 @@
             <a:fld id="{1D8BD707-D9CF-40AE-B4C6-C98DA3205C09}" type="datetimeFigureOut">
               <a:rPr lang="en-US" smtClean="0"/>
               <a:pPr/>
-              <a:t>11/12/2014</a:t>
+              <a:t>11/17/2014</a:t>
             </a:fld>
             <a:endParaRPr lang="en-US"/>
           </a:p>
@@ -2261,7 +2265,7 @@
             <a:fld id="{1D8BD707-D9CF-40AE-B4C6-C98DA3205C09}" type="datetimeFigureOut">
               <a:rPr lang="en-US" smtClean="0"/>
               <a:pPr/>
-              <a:t>11/12/2014</a:t>
+              <a:t>11/17/2014</a:t>
             </a:fld>
             <a:endParaRPr lang="en-US"/>
           </a:p>
@@ -2511,7 +2515,7 @@
             <a:fld id="{1D8BD707-D9CF-40AE-B4C6-C98DA3205C09}" type="datetimeFigureOut">
               <a:rPr lang="en-US" smtClean="0"/>
               <a:pPr/>
-              <a:t>11/12/2014</a:t>
+              <a:t>11/17/2014</a:t>
             </a:fld>
             <a:endParaRPr lang="en-US"/>
           </a:p>
@@ -2721,7 +2725,7 @@
             <a:fld id="{1D8BD707-D9CF-40AE-B4C6-C98DA3205C09}" type="datetimeFigureOut">
               <a:rPr lang="en-US" smtClean="0"/>
               <a:pPr/>
-              <a:t>11/12/2014</a:t>
+              <a:t>11/17/2014</a:t>
             </a:fld>
             <a:endParaRPr lang="en-US"/>
           </a:p>
@@ -3101,7 +3105,7 @@
         <p:spPr>
           <a:xfrm>
             <a:off x="381000" y="381000"/>
-            <a:ext cx="8001000" cy="6093976"/>
+            <a:ext cx="8001000" cy="6647974"/>
           </a:xfrm>
           <a:prstGeom prst="rect">
             <a:avLst/>
@@ -3264,6 +3268,32 @@
             <a:r>
               <a:rPr lang="en-US" b="1" dirty="0" smtClean="0"/>
               <a:t>p.m.</a:t>
+            </a:r>
+          </a:p>
+          <a:p>
+            <a:pPr algn="ctr"/>
+            <a:r>
+              <a:rPr lang="en-US" b="1" dirty="0" smtClean="0"/>
+              <a:t>Presentation and code examples at:</a:t>
+            </a:r>
+          </a:p>
+          <a:p>
+            <a:pPr algn="ctr"/>
+            <a:r>
+              <a:rPr lang="en-US" dirty="0">
+                <a:hlinkClick r:id="rId3"/>
+              </a:rPr>
+              <a:t>http://paul-burtness.github.io/webdevmojo</a:t>
+            </a:r>
+            <a:r>
+              <a:rPr lang="en-US" dirty="0" smtClean="0">
+                <a:hlinkClick r:id="rId3"/>
+              </a:rPr>
+              <a:t>/</a:t>
+            </a:r>
+            <a:r>
+              <a:rPr lang="en-US" dirty="0" smtClean="0"/>
+              <a:t> </a:t>
             </a:r>
             <a:endParaRPr lang="en-US" dirty="0"/>
           </a:p>
@@ -3353,74 +3383,324 @@
       </p:grpSpPr>
       <p:sp>
         <p:nvSpPr>
-          <p:cNvPr id="3" name="TextBox 2"/>
-          <p:cNvSpPr txBox="1"/>
-          <p:nvPr/>
-        </p:nvSpPr>
-        <p:spPr>
-          <a:xfrm>
-            <a:off x="1066800" y="1676400"/>
-            <a:ext cx="6781800" cy="1938992"/>
-          </a:xfrm>
-          <a:prstGeom prst="rect">
-            <a:avLst/>
-          </a:prstGeom>
-          <a:noFill/>
-        </p:spPr>
-        <p:txBody>
-          <a:bodyPr wrap="square" rtlCol="0">
-            <a:spAutoFit/>
+          <p:cNvPr id="2" name="Title 1"/>
+          <p:cNvSpPr>
+            <a:spLocks noGrp="1"/>
+          </p:cNvSpPr>
+          <p:nvPr>
+            <p:ph type="title"/>
+          </p:nvPr>
+        </p:nvSpPr>
+        <p:spPr/>
+        <p:txBody>
+          <a:bodyPr/>
+          <a:lstStyle/>
+          <a:p>
+            <a:r>
+              <a:rPr lang="en-US" dirty="0" smtClean="0"/>
+              <a:t>Why can’t you play?</a:t>
+            </a:r>
+            <a:endParaRPr lang="en-US" dirty="0"/>
+          </a:p>
+        </p:txBody>
+      </p:sp>
+      <p:sp>
+        <p:nvSpPr>
+          <p:cNvPr id="4" name="Content Placeholder 3"/>
+          <p:cNvSpPr>
+            <a:spLocks noGrp="1"/>
+          </p:cNvSpPr>
+          <p:nvPr>
+            <p:ph idx="1"/>
+          </p:nvPr>
+        </p:nvSpPr>
+        <p:spPr/>
+        <p:txBody>
+          <a:bodyPr/>
+          <a:lstStyle/>
+          <a:p>
+            <a:r>
+              <a:rPr lang="en-US" dirty="0" smtClean="0"/>
+              <a:t>Security risk of script insertion</a:t>
+            </a:r>
+          </a:p>
+          <a:p>
+            <a:r>
+              <a:rPr lang="en-US" dirty="0" smtClean="0"/>
+              <a:t>Interference with other scripts on the page</a:t>
+            </a:r>
+          </a:p>
+          <a:p>
+            <a:r>
+              <a:rPr lang="en-US" dirty="0" smtClean="0"/>
+              <a:t>Vendor quality control</a:t>
+            </a:r>
+          </a:p>
+          <a:p>
+            <a:r>
+              <a:rPr lang="en-US" dirty="0" smtClean="0"/>
+              <a:t>Just because</a:t>
+            </a:r>
+          </a:p>
+          <a:p>
+            <a:endParaRPr lang="en-US" dirty="0"/>
+          </a:p>
+        </p:txBody>
+      </p:sp>
+    </p:spTree>
+    <p:extLst>
+      <p:ext uri="{BB962C8B-B14F-4D97-AF65-F5344CB8AC3E}">
+        <p14:creationId xmlns:p14="http://schemas.microsoft.com/office/powerpoint/2010/main" val="1441364826"/>
+      </p:ext>
+    </p:extLst>
+  </p:cSld>
+  <p:clrMapOvr>
+    <a:masterClrMapping/>
+  </p:clrMapOvr>
+</p:sld>
+</file>
+
+<file path=ppt/slides/slide11.xml><?xml version="1.0" encoding="utf-8"?>
+<p:sld xmlns:a="http://schemas.openxmlformats.org/drawingml/2006/main" xmlns:r="http://schemas.openxmlformats.org/officeDocument/2006/relationships" xmlns:p="http://schemas.openxmlformats.org/presentationml/2006/main">
+  <p:cSld>
+    <p:spTree>
+      <p:nvGrpSpPr>
+        <p:cNvPr id="1" name=""/>
+        <p:cNvGrpSpPr/>
+        <p:nvPr/>
+      </p:nvGrpSpPr>
+      <p:grpSpPr>
+        <a:xfrm>
+          <a:off x="0" y="0"/>
+          <a:ext cx="0" cy="0"/>
+          <a:chOff x="0" y="0"/>
+          <a:chExt cx="0" cy="0"/>
+        </a:xfrm>
+      </p:grpSpPr>
+      <p:sp>
+        <p:nvSpPr>
+          <p:cNvPr id="2" name="Title 1"/>
+          <p:cNvSpPr>
+            <a:spLocks noGrp="1"/>
+          </p:cNvSpPr>
+          <p:nvPr>
+            <p:ph type="title"/>
+          </p:nvPr>
+        </p:nvSpPr>
+        <p:spPr/>
+        <p:txBody>
+          <a:bodyPr>
+            <a:normAutofit/>
           </a:bodyPr>
           <a:lstStyle/>
           <a:p>
-            <a:pPr marL="285750" indent="-285750">
-              <a:buFont typeface="Arial" panose="020B0604020202020204" pitchFamily="34" charset="0"/>
-              <a:buChar char="•"/>
-            </a:pPr>
-            <a:r>
-              <a:rPr lang="en-US" dirty="0" smtClean="0"/>
-              <a:t>Problem:  Inserting your JavaScript into a webpage with existing scripts can break the page.</a:t>
-            </a:r>
-          </a:p>
-          <a:p>
-            <a:pPr marL="285750" indent="-285750">
-              <a:buFont typeface="Arial" panose="020B0604020202020204" pitchFamily="34" charset="0"/>
-              <a:buChar char="•"/>
-            </a:pPr>
-            <a:r>
-              <a:rPr lang="en-US" dirty="0" smtClean="0"/>
-              <a:t>Reason:  By default, everything in JavaScript is global.</a:t>
-            </a:r>
-          </a:p>
-          <a:p>
-            <a:pPr marL="285750" indent="-285750">
-              <a:buFont typeface="Arial" panose="020B0604020202020204" pitchFamily="34" charset="0"/>
-              <a:buChar char="•"/>
-            </a:pPr>
-            <a:r>
-              <a:rPr lang="en-US" dirty="0" smtClean="0"/>
-              <a:t>Consequences:  You can overwrite existing variables and functions or they can overwrite your code.</a:t>
-            </a:r>
-          </a:p>
-          <a:p>
-            <a:pPr marL="285750" indent="-285750">
-              <a:buFont typeface="Arial" panose="020B0604020202020204" pitchFamily="34" charset="0"/>
-              <a:buChar char="•"/>
-            </a:pPr>
-            <a:r>
-              <a:rPr lang="en-US" dirty="0" smtClean="0"/>
-              <a:t>Example:  Broken Page</a:t>
-            </a:r>
-          </a:p>
-          <a:p>
-            <a:pPr marL="285750" indent="-285750">
-              <a:buFont typeface="Arial" panose="020B0604020202020204" pitchFamily="34" charset="0"/>
-              <a:buChar char="•"/>
-            </a:pPr>
-            <a:endParaRPr lang="en-US" baseline="-25000" dirty="0"/>
-          </a:p>
-        </p:txBody>
-      </p:sp>
+            <a:r>
+              <a:rPr lang="en-US" dirty="0" smtClean="0"/>
+              <a:t>Why </a:t>
+            </a:r>
+            <a:r>
+              <a:rPr lang="en-US" dirty="0" smtClean="0"/>
+              <a:t>would you want to play</a:t>
+            </a:r>
+            <a:r>
+              <a:rPr lang="en-US" dirty="0" smtClean="0"/>
+              <a:t>?</a:t>
+            </a:r>
+            <a:endParaRPr lang="en-US" dirty="0"/>
+          </a:p>
+        </p:txBody>
+      </p:sp>
+      <p:sp>
+        <p:nvSpPr>
+          <p:cNvPr id="4" name="Content Placeholder 3"/>
+          <p:cNvSpPr>
+            <a:spLocks noGrp="1"/>
+          </p:cNvSpPr>
+          <p:nvPr>
+            <p:ph idx="1"/>
+          </p:nvPr>
+        </p:nvSpPr>
+        <p:spPr/>
+        <p:txBody>
+          <a:bodyPr/>
+          <a:lstStyle/>
+          <a:p>
+            <a:r>
+              <a:rPr lang="en-US" dirty="0" smtClean="0"/>
+              <a:t>Include information from other sources on your site (JSONP and CORS)</a:t>
+            </a:r>
+          </a:p>
+          <a:p>
+            <a:r>
+              <a:rPr lang="en-US" dirty="0" smtClean="0"/>
+              <a:t>Enhanced use of information on your site (RSS and site API)</a:t>
+            </a:r>
+          </a:p>
+          <a:p>
+            <a:r>
+              <a:rPr lang="en-US" dirty="0" smtClean="0"/>
+              <a:t>Custom solutions</a:t>
+            </a:r>
+          </a:p>
+          <a:p>
+            <a:r>
+              <a:rPr lang="en-US" dirty="0" smtClean="0"/>
+              <a:t>Customize design</a:t>
+            </a:r>
+            <a:endParaRPr lang="en-US" dirty="0"/>
+          </a:p>
+        </p:txBody>
+      </p:sp>
+    </p:spTree>
+    <p:extLst>
+      <p:ext uri="{BB962C8B-B14F-4D97-AF65-F5344CB8AC3E}">
+        <p14:creationId xmlns:p14="http://schemas.microsoft.com/office/powerpoint/2010/main" val="3572719039"/>
+      </p:ext>
+    </p:extLst>
+  </p:cSld>
+  <p:clrMapOvr>
+    <a:masterClrMapping/>
+  </p:clrMapOvr>
+</p:sld>
+</file>
+
+<file path=ppt/slides/slide12.xml><?xml version="1.0" encoding="utf-8"?>
+<p:sld xmlns:a="http://schemas.openxmlformats.org/drawingml/2006/main" xmlns:r="http://schemas.openxmlformats.org/officeDocument/2006/relationships" xmlns:p="http://schemas.openxmlformats.org/presentationml/2006/main">
+  <p:cSld>
+    <p:spTree>
+      <p:nvGrpSpPr>
+        <p:cNvPr id="1" name=""/>
+        <p:cNvGrpSpPr/>
+        <p:nvPr/>
+      </p:nvGrpSpPr>
+      <p:grpSpPr>
+        <a:xfrm>
+          <a:off x="0" y="0"/>
+          <a:ext cx="0" cy="0"/>
+          <a:chOff x="0" y="0"/>
+          <a:chExt cx="0" cy="0"/>
+        </a:xfrm>
+      </p:grpSpPr>
+      <p:sp>
+        <p:nvSpPr>
+          <p:cNvPr id="2" name="Title 1"/>
+          <p:cNvSpPr>
+            <a:spLocks noGrp="1"/>
+          </p:cNvSpPr>
+          <p:nvPr>
+            <p:ph type="title"/>
+          </p:nvPr>
+        </p:nvSpPr>
+        <p:spPr/>
+        <p:txBody>
+          <a:bodyPr>
+            <a:normAutofit/>
+          </a:bodyPr>
+          <a:lstStyle/>
+          <a:p>
+            <a:r>
+              <a:rPr lang="en-US" dirty="0" smtClean="0"/>
+              <a:t>What do you have to play with?</a:t>
+            </a:r>
+            <a:endParaRPr lang="en-US" dirty="0"/>
+          </a:p>
+        </p:txBody>
+      </p:sp>
+      <p:sp>
+        <p:nvSpPr>
+          <p:cNvPr id="4" name="Content Placeholder 3"/>
+          <p:cNvSpPr>
+            <a:spLocks noGrp="1"/>
+          </p:cNvSpPr>
+          <p:nvPr>
+            <p:ph idx="1"/>
+          </p:nvPr>
+        </p:nvSpPr>
+        <p:spPr/>
+        <p:txBody>
+          <a:bodyPr/>
+          <a:lstStyle/>
+          <a:p>
+            <a:r>
+              <a:rPr lang="en-US" dirty="0" smtClean="0"/>
+              <a:t>JavaScript – statements, functions, objects, DOM interaction, etc.</a:t>
+            </a:r>
+          </a:p>
+          <a:p>
+            <a:r>
+              <a:rPr lang="en-US" dirty="0" smtClean="0"/>
+              <a:t>JavaScript Libraries – example:  jQuery</a:t>
+            </a:r>
+          </a:p>
+          <a:p>
+            <a:r>
+              <a:rPr lang="en-US" dirty="0" smtClean="0"/>
+              <a:t>Use "View Source" or "Inspect Element" to see if jQuery is loaded</a:t>
+            </a:r>
+          </a:p>
+          <a:p>
+            <a:r>
+              <a:rPr lang="en-US" dirty="0" smtClean="0"/>
+              <a:t>Try simple code to see if you can use it</a:t>
+            </a:r>
+            <a:br>
+              <a:rPr lang="en-US" dirty="0" smtClean="0"/>
+            </a:br>
+            <a:r>
+              <a:rPr lang="en-US" sz="2000" dirty="0" smtClean="0"/>
+              <a:t>demo – </a:t>
+            </a:r>
+            <a:r>
+              <a:rPr lang="en-US" sz="2000" dirty="0" smtClean="0">
+                <a:hlinkClick r:id="rId2"/>
+              </a:rPr>
+              <a:t>http://www.anokcounty.us/tryjquery</a:t>
+            </a:r>
+            <a:r>
+              <a:rPr lang="en-US" sz="2000" dirty="0" smtClean="0"/>
+              <a:t> </a:t>
+            </a:r>
+            <a:endParaRPr lang="en-US" sz="2000" dirty="0"/>
+          </a:p>
+        </p:txBody>
+      </p:sp>
+    </p:spTree>
+    <p:extLst>
+      <p:ext uri="{BB962C8B-B14F-4D97-AF65-F5344CB8AC3E}">
+        <p14:creationId xmlns:p14="http://schemas.microsoft.com/office/powerpoint/2010/main" val="3049985624"/>
+      </p:ext>
+    </p:extLst>
+  </p:cSld>
+  <p:clrMapOvr>
+    <a:masterClrMapping/>
+  </p:clrMapOvr>
+  <p:timing>
+    <p:tnLst>
+      <p:par>
+        <p:cTn id="1" dur="indefinite" restart="never" nodeType="tmRoot"/>
+      </p:par>
+    </p:tnLst>
+  </p:timing>
+</p:sld>
+</file>
+
+<file path=ppt/slides/slide13.xml><?xml version="1.0" encoding="utf-8"?>
+<p:sld xmlns:a="http://schemas.openxmlformats.org/drawingml/2006/main" xmlns:r="http://schemas.openxmlformats.org/officeDocument/2006/relationships" xmlns:p="http://schemas.openxmlformats.org/presentationml/2006/main">
+  <p:cSld>
+    <p:spTree>
+      <p:nvGrpSpPr>
+        <p:cNvPr id="1" name=""/>
+        <p:cNvGrpSpPr/>
+        <p:nvPr/>
+      </p:nvGrpSpPr>
+      <p:grpSpPr>
+        <a:xfrm>
+          <a:off x="0" y="0"/>
+          <a:ext cx="0" cy="0"/>
+          <a:chOff x="0" y="0"/>
+          <a:chExt cx="0" cy="0"/>
+        </a:xfrm>
+      </p:grpSpPr>
       <p:sp>
         <p:nvSpPr>
           <p:cNvPr id="2" name="Title 1"/>
@@ -3443,6 +3723,60 @@
               <a:t>How do you “play well with others?”</a:t>
             </a:r>
             <a:endParaRPr lang="en-US" dirty="0"/>
+          </a:p>
+        </p:txBody>
+      </p:sp>
+      <p:sp>
+        <p:nvSpPr>
+          <p:cNvPr id="4" name="Content Placeholder 3"/>
+          <p:cNvSpPr>
+            <a:spLocks noGrp="1"/>
+          </p:cNvSpPr>
+          <p:nvPr>
+            <p:ph idx="1"/>
+          </p:nvPr>
+        </p:nvSpPr>
+        <p:spPr/>
+        <p:txBody>
+          <a:bodyPr>
+            <a:normAutofit/>
+          </a:bodyPr>
+          <a:lstStyle/>
+          <a:p>
+            <a:r>
+              <a:rPr lang="en-US" dirty="0" smtClean="0"/>
+              <a:t>Problem – If your CMS uses JavaScript, your code can break the page (but not the CMS)</a:t>
+            </a:r>
+          </a:p>
+          <a:p>
+            <a:r>
+              <a:rPr lang="en-US" dirty="0" smtClean="0"/>
+              <a:t>Reason – By default all JavaScript on the page is global</a:t>
+            </a:r>
+          </a:p>
+          <a:p>
+            <a:r>
+              <a:rPr lang="en-US" dirty="0" smtClean="0"/>
+              <a:t>Consequences – You can overwrite existing variables and functions on the page, or the page can overwrite yours</a:t>
+            </a:r>
+            <a:br>
+              <a:rPr lang="en-US" dirty="0" smtClean="0"/>
+            </a:br>
+            <a:r>
+              <a:rPr lang="en-US" sz="2000" dirty="0" smtClean="0"/>
+              <a:t>demo – </a:t>
+            </a:r>
+            <a:r>
+              <a:rPr lang="en-US" sz="2000" dirty="0" smtClean="0">
+                <a:hlinkClick r:id="rId2"/>
+              </a:rPr>
+              <a:t>http://www.anokacounty.us/youbrokeit</a:t>
+            </a:r>
+            <a:r>
+              <a:rPr lang="en-US" sz="2000" dirty="0" smtClean="0"/>
+              <a:t> </a:t>
+            </a:r>
+            <a:endParaRPr lang="en-US" sz="2000" dirty="0"/>
           </a:p>
         </p:txBody>
       </p:sp>
@@ -3466,8 +3800,145 @@
 </p:sld>
 </file>
 
-<file path=ppt/slides/slide11.xml><?xml version="1.0" encoding="utf-8"?>
+<file path=ppt/slides/slide14.xml><?xml version="1.0" encoding="utf-8"?>
 <p:sld xmlns:a="http://schemas.openxmlformats.org/drawingml/2006/main" xmlns:r="http://schemas.openxmlformats.org/officeDocument/2006/relationships" xmlns:p="http://schemas.openxmlformats.org/presentationml/2006/main">
+  <p:cSld>
+    <p:spTree>
+      <p:nvGrpSpPr>
+        <p:cNvPr id="1" name=""/>
+        <p:cNvGrpSpPr/>
+        <p:nvPr/>
+      </p:nvGrpSpPr>
+      <p:grpSpPr>
+        <a:xfrm>
+          <a:off x="0" y="0"/>
+          <a:ext cx="0" cy="0"/>
+          <a:chOff x="0" y="0"/>
+          <a:chExt cx="0" cy="0"/>
+        </a:xfrm>
+      </p:grpSpPr>
+      <p:sp>
+        <p:nvSpPr>
+          <p:cNvPr id="2" name="Title 1"/>
+          <p:cNvSpPr>
+            <a:spLocks noGrp="1"/>
+          </p:cNvSpPr>
+          <p:nvPr>
+            <p:ph type="title"/>
+          </p:nvPr>
+        </p:nvSpPr>
+        <p:spPr/>
+        <p:txBody>
+          <a:bodyPr>
+            <a:normAutofit fontScale="90000"/>
+          </a:bodyPr>
+          <a:lstStyle/>
+          <a:p>
+            <a:r>
+              <a:rPr lang="en-US" dirty="0" smtClean="0"/>
+              <a:t>How do you “play well with others?”</a:t>
+            </a:r>
+            <a:endParaRPr lang="en-US" dirty="0"/>
+          </a:p>
+        </p:txBody>
+      </p:sp>
+      <p:sp>
+        <p:nvSpPr>
+          <p:cNvPr id="4" name="Content Placeholder 3"/>
+          <p:cNvSpPr>
+            <a:spLocks noGrp="1"/>
+          </p:cNvSpPr>
+          <p:nvPr>
+            <p:ph idx="1"/>
+          </p:nvPr>
+        </p:nvSpPr>
+        <p:spPr/>
+        <p:txBody>
+          <a:bodyPr>
+            <a:normAutofit/>
+          </a:bodyPr>
+          <a:lstStyle/>
+          <a:p>
+            <a:r>
+              <a:rPr lang="en-US" dirty="0" smtClean="0"/>
+              <a:t>Solution – Create  </a:t>
+            </a:r>
+            <a:r>
+              <a:rPr lang="en-US" dirty="0"/>
+              <a:t>a JavaScript “</a:t>
+            </a:r>
+            <a:r>
+              <a:rPr lang="en-US" dirty="0" smtClean="0"/>
+              <a:t>namespace,” a </a:t>
+            </a:r>
+            <a:r>
+              <a:rPr lang="en-US" dirty="0"/>
+              <a:t>single global object that contains all </a:t>
+            </a:r>
+            <a:r>
+              <a:rPr lang="en-US" dirty="0" smtClean="0"/>
+              <a:t>your variables </a:t>
+            </a:r>
+            <a:r>
+              <a:rPr lang="en-US" dirty="0"/>
+              <a:t>and </a:t>
+            </a:r>
+            <a:r>
+              <a:rPr lang="en-US" dirty="0" smtClean="0"/>
+              <a:t>functions</a:t>
+            </a:r>
+          </a:p>
+          <a:p>
+            <a:r>
+              <a:rPr lang="en-US" dirty="0" smtClean="0"/>
+              <a:t>Reference </a:t>
+            </a:r>
+            <a:r>
+              <a:rPr lang="en-US" dirty="0"/>
+              <a:t>- </a:t>
+            </a:r>
+            <a:r>
+              <a:rPr lang="en-US" dirty="0">
+                <a:hlinkClick r:id="rId2"/>
+              </a:rPr>
+              <a:t>http://www.kenneth-truyers.net/2013/04/27/javascript-namespaces-and-modules</a:t>
+            </a:r>
+            <a:r>
+              <a:rPr lang="en-US" smtClean="0">
+                <a:hlinkClick r:id="rId2"/>
+              </a:rPr>
+              <a:t>/</a:t>
+            </a:r>
+            <a:r>
+              <a:rPr lang="en-US" smtClean="0"/>
+              <a:t> </a:t>
+            </a:r>
+            <a:endParaRPr lang="en-US" dirty="0"/>
+          </a:p>
+        </p:txBody>
+      </p:sp>
+    </p:spTree>
+    <p:extLst>
+      <p:ext uri="{BB962C8B-B14F-4D97-AF65-F5344CB8AC3E}">
+        <p14:creationId xmlns:p14="http://schemas.microsoft.com/office/powerpoint/2010/main" val="1149033214"/>
+      </p:ext>
+    </p:extLst>
+  </p:cSld>
+  <p:clrMapOvr>
+    <a:masterClrMapping/>
+  </p:clrMapOvr>
+  <p:timing>
+    <p:tnLst>
+      <p:par>
+        <p:cTn id="1" dur="indefinite" restart="never" nodeType="tmRoot"/>
+      </p:par>
+    </p:tnLst>
+  </p:timing>
+</p:sld>
+</file>
+
+<file path=ppt/slides/slide15.xml><?xml version="1.0" encoding="utf-8"?>
+<p:sld xmlns:a="http://schemas.openxmlformats.org/drawingml/2006/main" xmlns:r="http://schemas.openxmlformats.org/officeDocument/2006/relationships" xmlns:p="http://schemas.openxmlformats.org/presentationml/2006/main" show="0">
   <p:cSld>
     <p:spTree>
       <p:nvGrpSpPr>
@@ -3547,6 +4018,14 @@
   <p:clrMapOvr>
     <a:masterClrMapping/>
   </p:clrMapOvr>
+  <mc:AlternateContent xmlns:mc="http://schemas.openxmlformats.org/markup-compatibility/2006">
+    <mc:Choice xmlns:p14="http://schemas.microsoft.com/office/powerpoint/2010/main" Requires="p14">
+      <p:transition spd="slow" p14:dur="2000"/>
+    </mc:Choice>
+    <mc:Fallback>
+      <p:transition spd="slow"/>
+    </mc:Fallback>
+  </mc:AlternateContent>
   <p:timing>
     <p:tnLst>
       <p:par>
@@ -3557,8 +4036,8 @@
 </p:sld>
 </file>
 
-<file path=ppt/slides/slide12.xml><?xml version="1.0" encoding="utf-8"?>
-<p:sld xmlns:a="http://schemas.openxmlformats.org/drawingml/2006/main" xmlns:r="http://schemas.openxmlformats.org/officeDocument/2006/relationships" xmlns:p="http://schemas.openxmlformats.org/presentationml/2006/main">
+<file path=ppt/slides/slide16.xml><?xml version="1.0" encoding="utf-8"?>
+<p:sld xmlns:a="http://schemas.openxmlformats.org/drawingml/2006/main" xmlns:r="http://schemas.openxmlformats.org/officeDocument/2006/relationships" xmlns:p="http://schemas.openxmlformats.org/presentationml/2006/main" show="0">
   <p:cSld>
     <p:spTree>
       <p:nvGrpSpPr>
@@ -3638,6 +4117,14 @@
   <p:clrMapOvr>
     <a:masterClrMapping/>
   </p:clrMapOvr>
+  <mc:AlternateContent xmlns:mc="http://schemas.openxmlformats.org/markup-compatibility/2006">
+    <mc:Choice xmlns:p14="http://schemas.microsoft.com/office/powerpoint/2010/main" Requires="p14">
+      <p:transition spd="slow" p14:dur="2000"/>
+    </mc:Choice>
+    <mc:Fallback>
+      <p:transition spd="slow"/>
+    </mc:Fallback>
+  </mc:AlternateContent>
   <p:timing>
     <p:tnLst>
       <p:par>
@@ -3648,8 +4135,8 @@
 </p:sld>
 </file>
 
-<file path=ppt/slides/slide13.xml><?xml version="1.0" encoding="utf-8"?>
-<p:sld xmlns:a="http://schemas.openxmlformats.org/drawingml/2006/main" xmlns:r="http://schemas.openxmlformats.org/officeDocument/2006/relationships" xmlns:p="http://schemas.openxmlformats.org/presentationml/2006/main">
+<file path=ppt/slides/slide17.xml><?xml version="1.0" encoding="utf-8"?>
+<p:sld xmlns:a="http://schemas.openxmlformats.org/drawingml/2006/main" xmlns:r="http://schemas.openxmlformats.org/officeDocument/2006/relationships" xmlns:p="http://schemas.openxmlformats.org/presentationml/2006/main" show="0">
   <p:cSld>
     <p:spTree>
       <p:nvGrpSpPr>
@@ -3885,6 +4372,14 @@
   <p:clrMapOvr>
     <a:masterClrMapping/>
   </p:clrMapOvr>
+  <mc:AlternateContent xmlns:mc="http://schemas.openxmlformats.org/markup-compatibility/2006">
+    <mc:Choice xmlns:p14="http://schemas.microsoft.com/office/powerpoint/2010/main" Requires="p14">
+      <p:transition spd="slow" p14:dur="2000"/>
+    </mc:Choice>
+    <mc:Fallback>
+      <p:transition spd="slow"/>
+    </mc:Fallback>
+  </mc:AlternateContent>
   <p:timing>
     <p:tnLst>
       <p:par>
@@ -3895,8 +4390,8 @@
 </p:sld>
 </file>
 
-<file path=ppt/slides/slide14.xml><?xml version="1.0" encoding="utf-8"?>
-<p:sld xmlns:a="http://schemas.openxmlformats.org/drawingml/2006/main" xmlns:r="http://schemas.openxmlformats.org/officeDocument/2006/relationships" xmlns:p="http://schemas.openxmlformats.org/presentationml/2006/main">
+<file path=ppt/slides/slide18.xml><?xml version="1.0" encoding="utf-8"?>
+<p:sld xmlns:a="http://schemas.openxmlformats.org/drawingml/2006/main" xmlns:r="http://schemas.openxmlformats.org/officeDocument/2006/relationships" xmlns:p="http://schemas.openxmlformats.org/presentationml/2006/main" show="0">
   <p:cSld>
     <p:spTree>
       <p:nvGrpSpPr>
@@ -3976,6 +4471,14 @@
   <p:clrMapOvr>
     <a:masterClrMapping/>
   </p:clrMapOvr>
+  <mc:AlternateContent xmlns:mc="http://schemas.openxmlformats.org/markup-compatibility/2006">
+    <mc:Choice xmlns:p14="http://schemas.microsoft.com/office/powerpoint/2010/main" Requires="p14">
+      <p:transition spd="slow" p14:dur="2000"/>
+    </mc:Choice>
+    <mc:Fallback>
+      <p:transition spd="slow"/>
+    </mc:Fallback>
+  </mc:AlternateContent>
   <p:timing>
     <p:tnLst>
       <p:par>
@@ -3986,7 +4489,7 @@
 </p:sld>
 </file>
 
-<file path=ppt/slides/slide15.xml><?xml version="1.0" encoding="utf-8"?>
+<file path=ppt/slides/slide19.xml><?xml version="1.0" encoding="utf-8"?>
 <p:sld xmlns:a="http://schemas.openxmlformats.org/drawingml/2006/main" xmlns:r="http://schemas.openxmlformats.org/officeDocument/2006/relationships" xmlns:p="http://schemas.openxmlformats.org/presentationml/2006/main">
   <p:cSld>
     <p:spTree>
@@ -4179,7 +4682,123 @@
 </p:sld>
 </file>
 
-<file path=ppt/slides/slide16.xml><?xml version="1.0" encoding="utf-8"?>
+<file path=ppt/slides/slide2.xml><?xml version="1.0" encoding="utf-8"?>
+<p:sld xmlns:a="http://schemas.openxmlformats.org/drawingml/2006/main" xmlns:r="http://schemas.openxmlformats.org/officeDocument/2006/relationships" xmlns:p="http://schemas.openxmlformats.org/presentationml/2006/main">
+  <p:cSld>
+    <p:spTree>
+      <p:nvGrpSpPr>
+        <p:cNvPr id="1" name=""/>
+        <p:cNvGrpSpPr/>
+        <p:nvPr/>
+      </p:nvGrpSpPr>
+      <p:grpSpPr>
+        <a:xfrm>
+          <a:off x="0" y="0"/>
+          <a:ext cx="0" cy="0"/>
+          <a:chOff x="0" y="0"/>
+          <a:chExt cx="0" cy="0"/>
+        </a:xfrm>
+      </p:grpSpPr>
+      <p:sp>
+        <p:nvSpPr>
+          <p:cNvPr id="3" name="TextBox 2"/>
+          <p:cNvSpPr txBox="1"/>
+          <p:nvPr/>
+        </p:nvSpPr>
+        <p:spPr>
+          <a:xfrm>
+            <a:off x="2438399" y="6019800"/>
+            <a:ext cx="4267200" cy="369332"/>
+          </a:xfrm>
+          <a:prstGeom prst="rect">
+            <a:avLst/>
+          </a:prstGeom>
+          <a:noFill/>
+        </p:spPr>
+        <p:txBody>
+          <a:bodyPr wrap="square" rtlCol="0">
+            <a:spAutoFit/>
+          </a:bodyPr>
+          <a:lstStyle/>
+          <a:p>
+            <a:r>
+              <a:rPr lang="en-US" dirty="0" smtClean="0"/>
+              <a:t>Austin Powers: The Spy Who Shagged Me</a:t>
+            </a:r>
+            <a:endParaRPr lang="en-US" dirty="0"/>
+          </a:p>
+        </p:txBody>
+      </p:sp>
+      <p:pic>
+        <p:nvPicPr>
+          <p:cNvPr id="4" name="gEuw2mgLRuQ?rel=0&amp;showinfo=0"/>
+          <p:cNvPicPr>
+            <a:picLocks noRot="1" noChangeAspect="1"/>
+          </p:cNvPicPr>
+          <p:nvPr>
+            <a:videoFile r:link="rId1"/>
+          </p:nvPr>
+        </p:nvPicPr>
+        <p:blipFill>
+          <a:blip r:embed="rId3"/>
+          <a:stretch>
+            <a:fillRect/>
+          </a:stretch>
+        </p:blipFill>
+        <p:spPr>
+          <a:xfrm>
+            <a:off x="955322" y="1524000"/>
+            <a:ext cx="7233355" cy="4068762"/>
+          </a:xfrm>
+          <a:prstGeom prst="rect">
+            <a:avLst/>
+          </a:prstGeom>
+        </p:spPr>
+      </p:pic>
+      <p:sp>
+        <p:nvSpPr>
+          <p:cNvPr id="2" name="Title 1"/>
+          <p:cNvSpPr>
+            <a:spLocks noGrp="1"/>
+          </p:cNvSpPr>
+          <p:nvPr>
+            <p:ph type="title"/>
+          </p:nvPr>
+        </p:nvSpPr>
+        <p:spPr/>
+        <p:txBody>
+          <a:bodyPr/>
+          <a:lstStyle/>
+          <a:p>
+            <a:r>
+              <a:rPr lang="en-US" dirty="0" smtClean="0"/>
+              <a:t>Losing your mojo?</a:t>
+            </a:r>
+            <a:endParaRPr lang="en-US" dirty="0"/>
+          </a:p>
+        </p:txBody>
+      </p:sp>
+    </p:spTree>
+    <p:extLst>
+      <p:ext uri="{BB962C8B-B14F-4D97-AF65-F5344CB8AC3E}">
+        <p14:creationId xmlns:p14="http://schemas.microsoft.com/office/powerpoint/2010/main" val="927391039"/>
+      </p:ext>
+    </p:extLst>
+  </p:cSld>
+  <p:clrMapOvr>
+    <a:masterClrMapping/>
+  </p:clrMapOvr>
+  <p:timing>
+    <p:tnLst>
+      <p:par>
+        <p:cTn id="1" dur="indefinite" restart="never" nodeType="tmRoot"/>
+      </p:par>
+    </p:tnLst>
+  </p:timing>
+</p:sld>
+</file>
+
+<file path=ppt/slides/slide20.xml><?xml version="1.0" encoding="utf-8"?>
 <p:sld xmlns:a="http://schemas.openxmlformats.org/drawingml/2006/main" xmlns:r="http://schemas.openxmlformats.org/officeDocument/2006/relationships" xmlns:p="http://schemas.openxmlformats.org/presentationml/2006/main">
   <p:cSld>
     <p:spTree>
@@ -4239,7 +4858,7 @@
 </p:sld>
 </file>
 
-<file path=ppt/slides/slide17.xml><?xml version="1.0" encoding="utf-8"?>
+<file path=ppt/slides/slide21.xml><?xml version="1.0" encoding="utf-8"?>
 <p:sld xmlns:a="http://schemas.openxmlformats.org/drawingml/2006/main" xmlns:r="http://schemas.openxmlformats.org/officeDocument/2006/relationships" xmlns:p="http://schemas.openxmlformats.org/presentationml/2006/main">
   <p:cSld>
     <p:spTree>
@@ -4299,7 +4918,7 @@
 </p:sld>
 </file>
 
-<file path=ppt/slides/slide18.xml><?xml version="1.0" encoding="utf-8"?>
+<file path=ppt/slides/slide22.xml><?xml version="1.0" encoding="utf-8"?>
 <p:sld xmlns:a="http://schemas.openxmlformats.org/drawingml/2006/main" xmlns:r="http://schemas.openxmlformats.org/officeDocument/2006/relationships" xmlns:p="http://schemas.openxmlformats.org/presentationml/2006/main">
   <p:cSld>
     <p:spTree>
@@ -4460,7 +5079,7 @@
 </p:sld>
 </file>
 
-<file path=ppt/slides/slide2.xml><?xml version="1.0" encoding="utf-8"?>
+<file path=ppt/slides/slide3.xml><?xml version="1.0" encoding="utf-8"?>
 <p:sld xmlns:a="http://schemas.openxmlformats.org/drawingml/2006/main" xmlns:r="http://schemas.openxmlformats.org/officeDocument/2006/relationships" xmlns:p="http://schemas.openxmlformats.org/presentationml/2006/main">
   <p:cSld>
     <p:spTree>
@@ -4479,79 +5098,90 @@
       </p:grpSpPr>
       <p:sp>
         <p:nvSpPr>
-          <p:cNvPr id="3" name="TextBox 2"/>
-          <p:cNvSpPr txBox="1"/>
-          <p:nvPr/>
-        </p:nvSpPr>
-        <p:spPr>
-          <a:xfrm>
-            <a:off x="381000" y="5867400"/>
-            <a:ext cx="2819400" cy="646331"/>
-          </a:xfrm>
-          <a:prstGeom prst="rect">
-            <a:avLst/>
-          </a:prstGeom>
-          <a:noFill/>
-        </p:spPr>
-        <p:txBody>
-          <a:bodyPr wrap="square" rtlCol="0">
-            <a:spAutoFit/>
-          </a:bodyPr>
-          <a:lstStyle/>
-          <a:p>
-            <a:r>
-              <a:rPr lang="en-US" dirty="0" smtClean="0"/>
-              <a:t>Austin Powers: The Spy Who Shagged Me</a:t>
+          <p:cNvPr id="2" name="Title 1"/>
+          <p:cNvSpPr>
+            <a:spLocks noGrp="1"/>
+          </p:cNvSpPr>
+          <p:nvPr>
+            <p:ph type="title"/>
+          </p:nvPr>
+        </p:nvSpPr>
+        <p:spPr/>
+        <p:txBody>
+          <a:bodyPr/>
+          <a:lstStyle/>
+          <a:p>
+            <a:r>
+              <a:rPr lang="en-US" dirty="0" smtClean="0"/>
+              <a:t>What is it?</a:t>
             </a:r>
             <a:endParaRPr lang="en-US" dirty="0"/>
           </a:p>
         </p:txBody>
       </p:sp>
-      <p:pic>
-        <p:nvPicPr>
-          <p:cNvPr id="4" name="gEuw2mgLRuQ?rel=0&amp;showinfo=0"/>
-          <p:cNvPicPr>
-            <a:picLocks noRot="1" noChangeAspect="1"/>
-          </p:cNvPicPr>
-          <p:nvPr>
-            <a:videoFile r:link="rId1"/>
-          </p:nvPr>
-        </p:nvPicPr>
-        <p:blipFill>
-          <a:blip r:embed="rId3"/>
-          <a:stretch>
-            <a:fillRect/>
-          </a:stretch>
-        </p:blipFill>
-        <p:spPr>
-          <a:xfrm>
-            <a:off x="2286000" y="2143125"/>
-            <a:ext cx="4572000" cy="2571750"/>
-          </a:xfrm>
-          <a:prstGeom prst="rect">
-            <a:avLst/>
-          </a:prstGeom>
-        </p:spPr>
-      </p:pic>
-      <p:sp>
-        <p:nvSpPr>
-          <p:cNvPr id="2" name="Title 1"/>
-          <p:cNvSpPr>
-            <a:spLocks noGrp="1"/>
-          </p:cNvSpPr>
-          <p:nvPr>
-            <p:ph type="title"/>
-          </p:nvPr>
-        </p:nvSpPr>
-        <p:spPr/>
-        <p:txBody>
-          <a:bodyPr/>
-          <a:lstStyle/>
-          <a:p>
-            <a:r>
-              <a:rPr lang="en-US" dirty="0" smtClean="0"/>
-              <a:t>Losing it?</a:t>
-            </a:r>
+      <p:sp>
+        <p:nvSpPr>
+          <p:cNvPr id="4" name="Content Placeholder 3"/>
+          <p:cNvSpPr>
+            <a:spLocks noGrp="1"/>
+          </p:cNvSpPr>
+          <p:nvPr>
+            <p:ph idx="1"/>
+          </p:nvPr>
+        </p:nvSpPr>
+        <p:spPr/>
+        <p:txBody>
+          <a:bodyPr/>
+          <a:lstStyle/>
+          <a:p>
+            <a:r>
+              <a:rPr lang="en-US" dirty="0" smtClean="0"/>
+              <a:t>Mojo – a power </a:t>
+            </a:r>
+            <a:r>
+              <a:rPr lang="en-US" dirty="0"/>
+              <a:t>that may seem magical and that allows someone to be very effective, successful, etc. </a:t>
+            </a:r>
+            <a:r>
+              <a:rPr lang="en-US" sz="1600" dirty="0">
+                <a:hlinkClick r:id="rId2"/>
+              </a:rPr>
+              <a:t>http://</a:t>
+            </a:r>
+            <a:r>
+              <a:rPr lang="en-US" sz="1600" dirty="0" smtClean="0">
+                <a:hlinkClick r:id="rId2"/>
+              </a:rPr>
+              <a:t>www.merriam-webster.com/dictionary/mojo</a:t>
+            </a:r>
+            <a:r>
+              <a:rPr lang="en-US" sz="1600" dirty="0" smtClean="0"/>
+              <a:t> </a:t>
+            </a:r>
+            <a:endParaRPr lang="en-US" sz="1600" dirty="0"/>
+          </a:p>
+          <a:p>
+            <a:r>
+              <a:rPr lang="en-US" dirty="0" err="1" smtClean="0"/>
+              <a:t>Webdevmojo</a:t>
+            </a:r>
+            <a:r>
+              <a:rPr lang="en-US" dirty="0" smtClean="0"/>
+              <a:t> – the ability to solve problems in an amazing way using a web application...</a:t>
+            </a:r>
+          </a:p>
+          <a:p>
+            <a:r>
+              <a:rPr lang="en-US" dirty="0"/>
+              <a:t>a</a:t>
+            </a:r>
+            <a:r>
+              <a:rPr lang="en-US" dirty="0" smtClean="0"/>
+              <a:t>nd have fun doing it!</a:t>
+            </a:r>
+            <a:endParaRPr lang="en-US" dirty="0"/>
+          </a:p>
+          <a:p>
             <a:endParaRPr lang="en-US" dirty="0"/>
           </a:p>
         </p:txBody>
@@ -4559,13 +5189,21 @@
     </p:spTree>
     <p:extLst>
       <p:ext uri="{BB962C8B-B14F-4D97-AF65-F5344CB8AC3E}">
-        <p14:creationId xmlns:p14="http://schemas.microsoft.com/office/powerpoint/2010/main" val="927391039"/>
+        <p14:creationId xmlns:p14="http://schemas.microsoft.com/office/powerpoint/2010/main" val="450929624"/>
       </p:ext>
     </p:extLst>
   </p:cSld>
   <p:clrMapOvr>
     <a:masterClrMapping/>
   </p:clrMapOvr>
+  <mc:AlternateContent xmlns:mc="http://schemas.openxmlformats.org/markup-compatibility/2006" xmlns:p14="http://schemas.microsoft.com/office/powerpoint/2010/main">
+    <mc:Choice Requires="p14">
+      <p:transition spd="slow" p14:dur="2000"/>
+    </mc:Choice>
+    <mc:Fallback xmlns="">
+      <p:transition spd="slow"/>
+    </mc:Fallback>
+  </mc:AlternateContent>
   <p:timing>
     <p:tnLst>
       <p:par>
@@ -4576,8 +5214,8 @@
 </p:sld>
 </file>
 
-<file path=ppt/slides/slide3.xml><?xml version="1.0" encoding="utf-8"?>
-<p:sld xmlns:a="http://schemas.openxmlformats.org/drawingml/2006/main" xmlns:r="http://schemas.openxmlformats.org/officeDocument/2006/relationships" xmlns:p="http://schemas.openxmlformats.org/presentationml/2006/main">
+<file path=ppt/slides/slide4.xml><?xml version="1.0" encoding="utf-8"?>
+<p:sld xmlns:a="http://schemas.openxmlformats.org/drawingml/2006/main" xmlns:r="http://schemas.openxmlformats.org/officeDocument/2006/relationships" xmlns:p="http://schemas.openxmlformats.org/presentationml/2006/main" show="0">
   <p:cSld>
     <p:spTree>
       <p:nvGrpSpPr>
@@ -4720,103 +5358,21 @@
     </p:spTree>
     <p:extLst>
       <p:ext uri="{BB962C8B-B14F-4D97-AF65-F5344CB8AC3E}">
-        <p14:creationId xmlns:p14="http://schemas.microsoft.com/office/powerpoint/2010/main" val="450929624"/>
+        <p14:creationId xmlns:p14="http://schemas.microsoft.com/office/powerpoint/2010/main" val="3767685774"/>
       </p:ext>
     </p:extLst>
   </p:cSld>
   <p:clrMapOvr>
     <a:masterClrMapping/>
   </p:clrMapOvr>
-  <p:timing>
-    <p:tnLst>
-      <p:par>
-        <p:cTn id="1" dur="indefinite" restart="never" nodeType="tmRoot"/>
-      </p:par>
-    </p:tnLst>
-  </p:timing>
-</p:sld>
-</file>
-
-<file path=ppt/slides/slide4.xml><?xml version="1.0" encoding="utf-8"?>
-<p:sld xmlns:a="http://schemas.openxmlformats.org/drawingml/2006/main" xmlns:r="http://schemas.openxmlformats.org/officeDocument/2006/relationships" xmlns:p="http://schemas.openxmlformats.org/presentationml/2006/main">
-  <p:cSld>
-    <p:spTree>
-      <p:nvGrpSpPr>
-        <p:cNvPr id="1" name=""/>
-        <p:cNvGrpSpPr/>
-        <p:nvPr/>
-      </p:nvGrpSpPr>
-      <p:grpSpPr>
-        <a:xfrm>
-          <a:off x="0" y="0"/>
-          <a:ext cx="0" cy="0"/>
-          <a:chOff x="0" y="0"/>
-          <a:chExt cx="0" cy="0"/>
-        </a:xfrm>
-      </p:grpSpPr>
-      <p:sp>
-        <p:nvSpPr>
-          <p:cNvPr id="3" name="TextBox 2"/>
-          <p:cNvSpPr txBox="1"/>
-          <p:nvPr/>
-        </p:nvSpPr>
-        <p:spPr>
-          <a:xfrm>
-            <a:off x="1524000" y="2362200"/>
-            <a:ext cx="2691121" cy="369332"/>
-          </a:xfrm>
-          <a:prstGeom prst="rect">
-            <a:avLst/>
-          </a:prstGeom>
-          <a:noFill/>
-        </p:spPr>
-        <p:txBody>
-          <a:bodyPr wrap="none" rtlCol="0">
-            <a:spAutoFit/>
-          </a:bodyPr>
-          <a:lstStyle/>
-          <a:p>
-            <a:r>
-              <a:rPr lang="en-US" dirty="0" smtClean="0"/>
-              <a:t>Example of Inmate Locator</a:t>
-            </a:r>
-            <a:endParaRPr lang="en-US" dirty="0"/>
-          </a:p>
-        </p:txBody>
-      </p:sp>
-      <p:sp>
-        <p:nvSpPr>
-          <p:cNvPr id="2" name="Title 1"/>
-          <p:cNvSpPr>
-            <a:spLocks noGrp="1"/>
-          </p:cNvSpPr>
-          <p:nvPr>
-            <p:ph type="title"/>
-          </p:nvPr>
-        </p:nvSpPr>
-        <p:spPr/>
-        <p:txBody>
-          <a:bodyPr/>
-          <a:lstStyle/>
-          <a:p>
-            <a:r>
-              <a:rPr lang="en-US" dirty="0" smtClean="0"/>
-              <a:t>How do you get it back?</a:t>
-            </a:r>
-            <a:endParaRPr lang="en-US" dirty="0"/>
-          </a:p>
-        </p:txBody>
-      </p:sp>
-    </p:spTree>
-    <p:extLst>
-      <p:ext uri="{BB962C8B-B14F-4D97-AF65-F5344CB8AC3E}">
-        <p14:creationId xmlns:p14="http://schemas.microsoft.com/office/powerpoint/2010/main" val="1079474859"/>
-      </p:ext>
-    </p:extLst>
-  </p:cSld>
-  <p:clrMapOvr>
-    <a:masterClrMapping/>
-  </p:clrMapOvr>
+  <mc:AlternateContent xmlns:mc="http://schemas.openxmlformats.org/markup-compatibility/2006" xmlns:p14="http://schemas.microsoft.com/office/powerpoint/2010/main">
+    <mc:Choice Requires="p14">
+      <p:transition spd="slow" p14:dur="2000"/>
+    </mc:Choice>
+    <mc:Fallback xmlns="">
+      <p:transition spd="slow"/>
+    </mc:Fallback>
+  </mc:AlternateContent>
   <p:timing>
     <p:tnLst>
       <p:par>
@@ -4861,7 +5417,56 @@
           <a:p>
             <a:r>
               <a:rPr lang="en-US" dirty="0" smtClean="0"/>
-              <a:t>Why JavaScript?</a:t>
+              <a:t>How do you lose it?</a:t>
+            </a:r>
+            <a:endParaRPr lang="en-US" dirty="0"/>
+          </a:p>
+        </p:txBody>
+      </p:sp>
+      <p:sp>
+        <p:nvSpPr>
+          <p:cNvPr id="3" name="Content Placeholder 2"/>
+          <p:cNvSpPr>
+            <a:spLocks noGrp="1"/>
+          </p:cNvSpPr>
+          <p:nvPr>
+            <p:ph idx="1"/>
+          </p:nvPr>
+        </p:nvSpPr>
+        <p:spPr/>
+        <p:txBody>
+          <a:bodyPr/>
+          <a:lstStyle/>
+          <a:p>
+            <a:r>
+              <a:rPr lang="en-US" dirty="0" smtClean="0"/>
+              <a:t>Migrate your website from a self-hosted site you build and control…</a:t>
+            </a:r>
+          </a:p>
+          <a:p>
+            <a:r>
+              <a:rPr lang="en-US" dirty="0" smtClean="0"/>
+              <a:t>To a managed-hosting site built with a 3</a:t>
+            </a:r>
+            <a:r>
+              <a:rPr lang="en-US" baseline="30000" dirty="0" smtClean="0"/>
+              <a:t>rd</a:t>
+            </a:r>
+            <a:r>
+              <a:rPr lang="en-US" dirty="0" smtClean="0"/>
+              <a:t>-party Content Management System (CMS)</a:t>
+            </a:r>
+          </a:p>
+          <a:p>
+            <a:r>
+              <a:rPr lang="en-US" dirty="0" smtClean="0"/>
+              <a:t>Pros – no longer responsible for managing a server, distributed authoring, etc.</a:t>
+            </a:r>
+          </a:p>
+          <a:p>
+            <a:r>
+              <a:rPr lang="en-US" dirty="0" smtClean="0"/>
+              <a:t>Cons – format limitations, limited to built-in functions</a:t>
             </a:r>
             <a:endParaRPr lang="en-US" dirty="0"/>
           </a:p>
@@ -4870,7 +5475,7 @@
     </p:spTree>
     <p:extLst>
       <p:ext uri="{BB962C8B-B14F-4D97-AF65-F5344CB8AC3E}">
-        <p14:creationId xmlns:p14="http://schemas.microsoft.com/office/powerpoint/2010/main" val="2307883125"/>
+        <p14:creationId xmlns:p14="http://schemas.microsoft.com/office/powerpoint/2010/main" val="3285728424"/>
       </p:ext>
     </p:extLst>
   </p:cSld>
@@ -4906,57 +5511,22 @@
       </p:grpSpPr>
       <p:sp>
         <p:nvSpPr>
-          <p:cNvPr id="3" name="TextBox 2"/>
-          <p:cNvSpPr txBox="1"/>
-          <p:nvPr/>
-        </p:nvSpPr>
-        <p:spPr>
-          <a:xfrm>
-            <a:off x="2514600" y="2743200"/>
-            <a:ext cx="2940485" cy="1477328"/>
-          </a:xfrm>
-          <a:prstGeom prst="rect">
-            <a:avLst/>
-          </a:prstGeom>
-          <a:noFill/>
-        </p:spPr>
-        <p:txBody>
-          <a:bodyPr wrap="none" rtlCol="0">
-            <a:spAutoFit/>
-          </a:bodyPr>
-          <a:lstStyle/>
-          <a:p>
-            <a:r>
-              <a:rPr lang="en-US" dirty="0" smtClean="0"/>
-              <a:t>JavaScript basics</a:t>
-            </a:r>
-          </a:p>
-          <a:p>
-            <a:r>
-              <a:rPr lang="en-US" dirty="0" smtClean="0"/>
-              <a:t>HTML page in browser</a:t>
-            </a:r>
-          </a:p>
-          <a:p>
-            <a:r>
-              <a:rPr lang="en-US" dirty="0" smtClean="0"/>
-              <a:t>&lt;script&gt;&lt;/script&gt;</a:t>
-            </a:r>
-          </a:p>
-          <a:p>
-            <a:r>
-              <a:rPr lang="en-US" dirty="0" smtClean="0"/>
-              <a:t>Code between tags</a:t>
-            </a:r>
-          </a:p>
-          <a:p>
-            <a:r>
-              <a:rPr lang="en-US" dirty="0" err="1" smtClean="0"/>
-              <a:t>Src</a:t>
-            </a:r>
-            <a:r>
-              <a:rPr lang="en-US" dirty="0" smtClean="0"/>
-              <a:t> that loads file from server</a:t>
+          <p:cNvPr id="2" name="Title 1"/>
+          <p:cNvSpPr>
+            <a:spLocks noGrp="1"/>
+          </p:cNvSpPr>
+          <p:nvPr>
+            <p:ph type="title"/>
+          </p:nvPr>
+        </p:nvSpPr>
+        <p:spPr/>
+        <p:txBody>
+          <a:bodyPr/>
+          <a:lstStyle/>
+          <a:p>
+            <a:r>
+              <a:rPr lang="en-US" dirty="0" smtClean="0"/>
+              <a:t>How do you get it back?</a:t>
             </a:r>
             <a:endParaRPr lang="en-US" dirty="0"/>
           </a:p>
@@ -4964,23 +5534,60 @@
       </p:sp>
       <p:sp>
         <p:nvSpPr>
-          <p:cNvPr id="2" name="Title 1"/>
-          <p:cNvSpPr>
-            <a:spLocks noGrp="1"/>
-          </p:cNvSpPr>
-          <p:nvPr>
-            <p:ph type="title"/>
-          </p:nvPr>
-        </p:nvSpPr>
-        <p:spPr/>
-        <p:txBody>
-          <a:bodyPr/>
-          <a:lstStyle/>
-          <a:p>
-            <a:r>
-              <a:rPr lang="en-US" dirty="0" smtClean="0"/>
-              <a:t>How do you play?</a:t>
-            </a:r>
+          <p:cNvPr id="4" name="Content Placeholder 3"/>
+          <p:cNvSpPr>
+            <a:spLocks noGrp="1"/>
+          </p:cNvSpPr>
+          <p:nvPr>
+            <p:ph idx="1"/>
+          </p:nvPr>
+        </p:nvSpPr>
+        <p:spPr/>
+        <p:txBody>
+          <a:bodyPr/>
+          <a:lstStyle/>
+          <a:p>
+            <a:r>
+              <a:rPr lang="en-US" dirty="0" smtClean="0"/>
+              <a:t>Pay the vendor</a:t>
+            </a:r>
+          </a:p>
+          <a:p>
+            <a:r>
+              <a:rPr lang="en-US" dirty="0" smtClean="0"/>
+              <a:t>Modify the CMS</a:t>
+            </a:r>
+          </a:p>
+          <a:p>
+            <a:r>
+              <a:rPr lang="en-US" dirty="0" smtClean="0"/>
+              <a:t>Build applications on another server</a:t>
+            </a:r>
+          </a:p>
+          <a:p>
+            <a:r>
+              <a:rPr lang="en-US" dirty="0" smtClean="0"/>
+              <a:t>Integrate your applications with the CMS</a:t>
+            </a:r>
+            <a:br>
+              <a:rPr lang="en-US" dirty="0" smtClean="0"/>
+            </a:br>
+            <a:r>
+              <a:rPr lang="en-US" sz="2000" dirty="0" smtClean="0"/>
+              <a:t>demo – </a:t>
+            </a:r>
+            <a:r>
+              <a:rPr lang="en-US" sz="2000" dirty="0" smtClean="0">
+                <a:hlinkClick r:id="rId2"/>
+              </a:rPr>
+              <a:t>http://www.anokacounty.us/InmateLocator</a:t>
+            </a:r>
+            <a:r>
+              <a:rPr lang="en-US" sz="2000" dirty="0" smtClean="0"/>
+              <a:t> </a:t>
+            </a:r>
+          </a:p>
+          <a:p>
             <a:endParaRPr lang="en-US" dirty="0"/>
           </a:p>
         </p:txBody>
@@ -4988,7 +5595,7 @@
     </p:spTree>
     <p:extLst>
       <p:ext uri="{BB962C8B-B14F-4D97-AF65-F5344CB8AC3E}">
-        <p14:creationId xmlns:p14="http://schemas.microsoft.com/office/powerpoint/2010/main" val="3746872012"/>
+        <p14:creationId xmlns:p14="http://schemas.microsoft.com/office/powerpoint/2010/main" val="1079474859"/>
       </p:ext>
     </p:extLst>
   </p:cSld>
@@ -5024,108 +5631,57 @@
       </p:grpSpPr>
       <p:sp>
         <p:nvSpPr>
-          <p:cNvPr id="3" name="TextBox 2"/>
-          <p:cNvSpPr txBox="1"/>
-          <p:nvPr/>
-        </p:nvSpPr>
-        <p:spPr>
-          <a:xfrm>
-            <a:off x="2514600" y="2743200"/>
-            <a:ext cx="3532698" cy="3139321"/>
-          </a:xfrm>
-          <a:prstGeom prst="rect">
-            <a:avLst/>
-          </a:prstGeom>
-          <a:noFill/>
-        </p:spPr>
-        <p:txBody>
-          <a:bodyPr wrap="none" rtlCol="0">
-            <a:spAutoFit/>
-          </a:bodyPr>
-          <a:lstStyle/>
-          <a:p>
-            <a:r>
-              <a:rPr lang="en-US" dirty="0" smtClean="0"/>
-              <a:t>How to get JavaScript into the page</a:t>
-            </a:r>
-          </a:p>
-          <a:p>
-            <a:r>
-              <a:rPr lang="en-US" dirty="0" smtClean="0"/>
-              <a:t>HTML editor</a:t>
-            </a:r>
-          </a:p>
-          <a:p>
-            <a:r>
-              <a:rPr lang="en-US" dirty="0" smtClean="0"/>
-              <a:t>Custom HTML</a:t>
-            </a:r>
-          </a:p>
-          <a:p>
-            <a:r>
-              <a:rPr lang="en-US" dirty="0" smtClean="0"/>
-              <a:t>Editable part of a template</a:t>
-            </a:r>
-          </a:p>
-          <a:p>
+          <p:cNvPr id="2" name="Title 1"/>
+          <p:cNvSpPr>
+            <a:spLocks noGrp="1"/>
+          </p:cNvSpPr>
+          <p:nvPr>
+            <p:ph type="title"/>
+          </p:nvPr>
+        </p:nvSpPr>
+        <p:spPr/>
+        <p:txBody>
+          <a:bodyPr/>
+          <a:lstStyle/>
+          <a:p>
+            <a:r>
+              <a:rPr lang="en-US" dirty="0" smtClean="0"/>
+              <a:t>Why JavaScript?</a:t>
+            </a:r>
             <a:endParaRPr lang="en-US" dirty="0"/>
           </a:p>
-          <a:p>
-            <a:r>
-              <a:rPr lang="en-US" dirty="0" smtClean="0"/>
-              <a:t>How to see if it works</a:t>
-            </a:r>
-          </a:p>
-          <a:p>
-            <a:r>
-              <a:rPr lang="en-US" dirty="0" smtClean="0"/>
-              <a:t>Check with support/documentation</a:t>
-            </a:r>
-          </a:p>
-          <a:p>
-            <a:r>
-              <a:rPr lang="en-US" dirty="0" smtClean="0"/>
-              <a:t>Try it</a:t>
-            </a:r>
-          </a:p>
-          <a:p>
-            <a:r>
-              <a:rPr lang="en-US" dirty="0" smtClean="0"/>
-              <a:t>Does it stay</a:t>
-            </a:r>
-          </a:p>
-          <a:p>
-            <a:r>
-              <a:rPr lang="en-US" dirty="0" smtClean="0"/>
-              <a:t>Does it cause an error</a:t>
-            </a:r>
-          </a:p>
-          <a:p>
-            <a:r>
-              <a:rPr lang="en-US" dirty="0" smtClean="0"/>
-              <a:t>Does it display</a:t>
-            </a:r>
-          </a:p>
-        </p:txBody>
-      </p:sp>
-      <p:sp>
-        <p:nvSpPr>
-          <p:cNvPr id="2" name="Title 1"/>
-          <p:cNvSpPr>
-            <a:spLocks noGrp="1"/>
-          </p:cNvSpPr>
-          <p:nvPr>
-            <p:ph type="title"/>
-          </p:nvPr>
-        </p:nvSpPr>
-        <p:spPr/>
-        <p:txBody>
-          <a:bodyPr/>
-          <a:lstStyle/>
-          <a:p>
-            <a:r>
-              <a:rPr lang="en-US" dirty="0" smtClean="0"/>
-              <a:t>Can you play?</a:t>
+        </p:txBody>
+      </p:sp>
+      <p:sp>
+        <p:nvSpPr>
+          <p:cNvPr id="3" name="Content Placeholder 2"/>
+          <p:cNvSpPr>
+            <a:spLocks noGrp="1"/>
+          </p:cNvSpPr>
+          <p:nvPr>
+            <p:ph idx="1"/>
+          </p:nvPr>
+        </p:nvSpPr>
+        <p:spPr/>
+        <p:txBody>
+          <a:bodyPr/>
+          <a:lstStyle/>
+          <a:p>
+            <a:r>
+              <a:rPr lang="en-US" dirty="0" smtClean="0"/>
+              <a:t>Java – runtime issues, learning curve</a:t>
+            </a:r>
+          </a:p>
+          <a:p>
+            <a:r>
+              <a:rPr lang="en-US" dirty="0" smtClean="0"/>
+              <a:t>Flash – security issues, no iOS support</a:t>
+            </a:r>
+          </a:p>
+          <a:p>
+            <a:r>
+              <a:rPr lang="en-US" dirty="0" smtClean="0"/>
+              <a:t>JavaScript – universal support, appropriate for wide range of solutions, approachable</a:t>
             </a:r>
             <a:endParaRPr lang="en-US" dirty="0"/>
           </a:p>
@@ -5134,13 +5690,20 @@
     </p:spTree>
     <p:extLst>
       <p:ext uri="{BB962C8B-B14F-4D97-AF65-F5344CB8AC3E}">
-        <p14:creationId xmlns:p14="http://schemas.microsoft.com/office/powerpoint/2010/main" val="2311885351"/>
+        <p14:creationId xmlns:p14="http://schemas.microsoft.com/office/powerpoint/2010/main" val="2307883125"/>
       </p:ext>
     </p:extLst>
   </p:cSld>
   <p:clrMapOvr>
     <a:masterClrMapping/>
   </p:clrMapOvr>
+  <p:timing>
+    <p:tnLst>
+      <p:par>
+        <p:cTn id="1" dur="indefinite" restart="never" nodeType="tmRoot"/>
+      </p:par>
+    </p:tnLst>
+  </p:timing>
 </p:sld>
 </file>
 
@@ -5163,85 +5726,347 @@
       </p:grpSpPr>
       <p:sp>
         <p:nvSpPr>
-          <p:cNvPr id="3" name="TextBox 2"/>
-          <p:cNvSpPr txBox="1"/>
-          <p:nvPr/>
-        </p:nvSpPr>
-        <p:spPr>
-          <a:xfrm>
-            <a:off x="1143000" y="2667000"/>
-            <a:ext cx="4114800" cy="1477328"/>
-          </a:xfrm>
-          <a:prstGeom prst="rect">
-            <a:avLst/>
-          </a:prstGeom>
-          <a:noFill/>
-        </p:spPr>
-        <p:txBody>
-          <a:bodyPr wrap="square" rtlCol="0">
-            <a:spAutoFit/>
+          <p:cNvPr id="2" name="Title 1"/>
+          <p:cNvSpPr>
+            <a:spLocks noGrp="1"/>
+          </p:cNvSpPr>
+          <p:nvPr>
+            <p:ph type="title"/>
+          </p:nvPr>
+        </p:nvSpPr>
+        <p:spPr/>
+        <p:txBody>
+          <a:bodyPr/>
+          <a:lstStyle/>
+          <a:p>
+            <a:r>
+              <a:rPr lang="en-US" dirty="0" smtClean="0"/>
+              <a:t>How do you play?</a:t>
+            </a:r>
+            <a:endParaRPr lang="en-US" dirty="0"/>
+          </a:p>
+        </p:txBody>
+      </p:sp>
+      <p:sp>
+        <p:nvSpPr>
+          <p:cNvPr id="4" name="Content Placeholder 3"/>
+          <p:cNvSpPr>
+            <a:spLocks noGrp="1"/>
+          </p:cNvSpPr>
+          <p:nvPr>
+            <p:ph idx="1"/>
+          </p:nvPr>
+        </p:nvSpPr>
+        <p:spPr/>
+        <p:txBody>
+          <a:bodyPr>
+            <a:normAutofit fontScale="55000" lnSpcReduction="20000"/>
           </a:bodyPr>
           <a:lstStyle/>
           <a:p>
-            <a:r>
-              <a:rPr lang="en-US" dirty="0" smtClean="0"/>
-              <a:t>Good reasons why provider may not want to allow embedded scripting:</a:t>
-            </a:r>
-          </a:p>
-          <a:p>
-            <a:r>
-              <a:rPr lang="en-US" dirty="0" smtClean="0"/>
-              <a:t>May mess up something else on the page</a:t>
-            </a:r>
-          </a:p>
-          <a:p>
-            <a:r>
-              <a:rPr lang="en-US" dirty="0" smtClean="0"/>
-              <a:t>Can be a security risk</a:t>
-            </a:r>
-          </a:p>
-          <a:p>
-            <a:r>
-              <a:rPr lang="en-US" dirty="0" smtClean="0"/>
-              <a:t>Too complicated</a:t>
-            </a:r>
-            <a:endParaRPr lang="en-US" dirty="0"/>
-          </a:p>
-        </p:txBody>
-      </p:sp>
-      <p:sp>
-        <p:nvSpPr>
-          <p:cNvPr id="2" name="Title 1"/>
-          <p:cNvSpPr>
-            <a:spLocks noGrp="1"/>
-          </p:cNvSpPr>
-          <p:nvPr>
-            <p:ph type="title"/>
-          </p:nvPr>
-        </p:nvSpPr>
-        <p:spPr/>
-        <p:txBody>
-          <a:bodyPr/>
-          <a:lstStyle/>
-          <a:p>
-            <a:r>
-              <a:rPr lang="en-US" dirty="0" smtClean="0"/>
-              <a:t>Why can’t you play?</a:t>
-            </a:r>
-            <a:endParaRPr lang="en-US" dirty="0"/>
+            <a:pPr marL="0" indent="0">
+              <a:buNone/>
+            </a:pPr>
+            <a:r>
+              <a:rPr lang="en-US" dirty="0" smtClean="0">
+                <a:latin typeface="Courier New" panose="02070309020205020404" pitchFamily="49" charset="0"/>
+                <a:cs typeface="Courier New" panose="02070309020205020404" pitchFamily="49" charset="0"/>
+              </a:rPr>
+              <a:t>&lt;html&gt;</a:t>
+            </a:r>
+          </a:p>
+          <a:p>
+            <a:pPr marL="0" indent="0">
+              <a:buNone/>
+            </a:pPr>
+            <a:r>
+              <a:rPr lang="en-US" dirty="0" smtClean="0">
+                <a:latin typeface="Courier New" panose="02070309020205020404" pitchFamily="49" charset="0"/>
+                <a:cs typeface="Courier New" panose="02070309020205020404" pitchFamily="49" charset="0"/>
+              </a:rPr>
+              <a:t>&lt;head&gt;</a:t>
+            </a:r>
+          </a:p>
+          <a:p>
+            <a:pPr marL="0" indent="0">
+              <a:buNone/>
+            </a:pPr>
+            <a:r>
+              <a:rPr lang="en-US" dirty="0" smtClean="0">
+                <a:latin typeface="Courier New" panose="02070309020205020404" pitchFamily="49" charset="0"/>
+                <a:cs typeface="Courier New" panose="02070309020205020404" pitchFamily="49" charset="0"/>
+              </a:rPr>
+              <a:t>&lt;title&gt;My JavaScript Page&lt;/title&gt;</a:t>
+            </a:r>
+          </a:p>
+          <a:p>
+            <a:pPr marL="0" indent="0">
+              <a:buNone/>
+            </a:pPr>
+            <a:r>
+              <a:rPr lang="en-US" b="1" dirty="0">
+                <a:latin typeface="Courier New" panose="02070309020205020404" pitchFamily="49" charset="0"/>
+                <a:cs typeface="Courier New" panose="02070309020205020404" pitchFamily="49" charset="0"/>
+              </a:rPr>
+              <a:t>&lt;script type="text/</a:t>
+            </a:r>
+            <a:r>
+              <a:rPr lang="en-US" b="1" dirty="0" err="1">
+                <a:latin typeface="Courier New" panose="02070309020205020404" pitchFamily="49" charset="0"/>
+                <a:cs typeface="Courier New" panose="02070309020205020404" pitchFamily="49" charset="0"/>
+              </a:rPr>
+              <a:t>javascript</a:t>
+            </a:r>
+            <a:r>
+              <a:rPr lang="en-US" b="1" dirty="0">
+                <a:latin typeface="Courier New" panose="02070309020205020404" pitchFamily="49" charset="0"/>
+                <a:cs typeface="Courier New" panose="02070309020205020404" pitchFamily="49" charset="0"/>
+              </a:rPr>
+              <a:t>" </a:t>
+            </a:r>
+            <a:r>
+              <a:rPr lang="en-US" b="1" dirty="0" err="1">
+                <a:latin typeface="Courier New" panose="02070309020205020404" pitchFamily="49" charset="0"/>
+                <a:cs typeface="Courier New" panose="02070309020205020404" pitchFamily="49" charset="0"/>
+              </a:rPr>
+              <a:t>src</a:t>
+            </a:r>
+            <a:r>
+              <a:rPr lang="en-US" b="1" dirty="0">
+                <a:latin typeface="Courier New" panose="02070309020205020404" pitchFamily="49" charset="0"/>
+                <a:cs typeface="Courier New" panose="02070309020205020404" pitchFamily="49" charset="0"/>
+              </a:rPr>
+              <a:t>="http://yourserver.com/</a:t>
+            </a:r>
+            <a:r>
+              <a:rPr lang="en-US" b="1" dirty="0" err="1">
+                <a:latin typeface="Courier New" panose="02070309020205020404" pitchFamily="49" charset="0"/>
+                <a:cs typeface="Courier New" panose="02070309020205020404" pitchFamily="49" charset="0"/>
+              </a:rPr>
+              <a:t>js</a:t>
+            </a:r>
+            <a:r>
+              <a:rPr lang="en-US" b="1" dirty="0">
+                <a:latin typeface="Courier New" panose="02070309020205020404" pitchFamily="49" charset="0"/>
+                <a:cs typeface="Courier New" panose="02070309020205020404" pitchFamily="49" charset="0"/>
+              </a:rPr>
+              <a:t>/script.js"&gt;&lt;/script&gt;</a:t>
+            </a:r>
+          </a:p>
+          <a:p>
+            <a:pPr marL="0" indent="0">
+              <a:buNone/>
+            </a:pPr>
+            <a:r>
+              <a:rPr lang="en-US" b="1" dirty="0" smtClean="0">
+                <a:latin typeface="Courier New" panose="02070309020205020404" pitchFamily="49" charset="0"/>
+                <a:cs typeface="Courier New" panose="02070309020205020404" pitchFamily="49" charset="0"/>
+              </a:rPr>
+              <a:t>&lt;/</a:t>
+            </a:r>
+            <a:r>
+              <a:rPr lang="en-US" b="1" dirty="0" smtClean="0">
+                <a:latin typeface="Courier New" panose="02070309020205020404" pitchFamily="49" charset="0"/>
+                <a:cs typeface="Courier New" panose="02070309020205020404" pitchFamily="49" charset="0"/>
+              </a:rPr>
+              <a:t>head&gt;</a:t>
+            </a:r>
+          </a:p>
+          <a:p>
+            <a:pPr marL="0" indent="0">
+              <a:buNone/>
+            </a:pPr>
+            <a:r>
+              <a:rPr lang="en-US" dirty="0" smtClean="0">
+                <a:latin typeface="Courier New" panose="02070309020205020404" pitchFamily="49" charset="0"/>
+                <a:cs typeface="Courier New" panose="02070309020205020404" pitchFamily="49" charset="0"/>
+              </a:rPr>
+              <a:t>&lt;body</a:t>
+            </a:r>
+            <a:r>
+              <a:rPr lang="en-US" dirty="0" smtClean="0">
+                <a:latin typeface="Courier New" panose="02070309020205020404" pitchFamily="49" charset="0"/>
+                <a:cs typeface="Courier New" panose="02070309020205020404" pitchFamily="49" charset="0"/>
+              </a:rPr>
+              <a:t>&gt;</a:t>
+            </a:r>
+          </a:p>
+          <a:p>
+            <a:pPr marL="0" indent="0">
+              <a:buNone/>
+            </a:pPr>
+            <a:r>
+              <a:rPr lang="en-US" dirty="0" smtClean="0">
+                <a:latin typeface="Courier New" panose="02070309020205020404" pitchFamily="49" charset="0"/>
+                <a:cs typeface="Courier New" panose="02070309020205020404" pitchFamily="49" charset="0"/>
+              </a:rPr>
+              <a:t>&lt;h1&gt;</a:t>
+            </a:r>
+            <a:endParaRPr lang="en-US" dirty="0" smtClean="0">
+              <a:latin typeface="Courier New" panose="02070309020205020404" pitchFamily="49" charset="0"/>
+              <a:cs typeface="Courier New" panose="02070309020205020404" pitchFamily="49" charset="0"/>
+            </a:endParaRPr>
+          </a:p>
+          <a:p>
+            <a:pPr marL="0" indent="0">
+              <a:buNone/>
+            </a:pPr>
+            <a:r>
+              <a:rPr lang="en-US" b="1" dirty="0">
+                <a:latin typeface="Courier New" panose="02070309020205020404" pitchFamily="49" charset="0"/>
+                <a:cs typeface="Courier New" panose="02070309020205020404" pitchFamily="49" charset="0"/>
+              </a:rPr>
+              <a:t>&lt;script type="</a:t>
+            </a:r>
+            <a:r>
+              <a:rPr lang="en-US" b="1" dirty="0" smtClean="0">
+                <a:latin typeface="Courier New" panose="02070309020205020404" pitchFamily="49" charset="0"/>
+                <a:cs typeface="Courier New" panose="02070309020205020404" pitchFamily="49" charset="0"/>
+              </a:rPr>
+              <a:t>text/</a:t>
+            </a:r>
+            <a:r>
+              <a:rPr lang="en-US" b="1" dirty="0" err="1" smtClean="0">
+                <a:latin typeface="Courier New" panose="02070309020205020404" pitchFamily="49" charset="0"/>
+                <a:cs typeface="Courier New" panose="02070309020205020404" pitchFamily="49" charset="0"/>
+              </a:rPr>
+              <a:t>javascript</a:t>
+            </a:r>
+            <a:r>
+              <a:rPr lang="en-US" b="1" dirty="0" smtClean="0">
+                <a:latin typeface="Courier New" panose="02070309020205020404" pitchFamily="49" charset="0"/>
+                <a:cs typeface="Courier New" panose="02070309020205020404" pitchFamily="49" charset="0"/>
+              </a:rPr>
+              <a:t>"&gt;</a:t>
+            </a:r>
+          </a:p>
+          <a:p>
+            <a:pPr marL="0" indent="0">
+              <a:buNone/>
+            </a:pPr>
+            <a:r>
+              <a:rPr lang="en-US" b="1" dirty="0" err="1" smtClean="0">
+                <a:latin typeface="Courier New" panose="02070309020205020404" pitchFamily="49" charset="0"/>
+                <a:cs typeface="Courier New" panose="02070309020205020404" pitchFamily="49" charset="0"/>
+              </a:rPr>
+              <a:t>document.write</a:t>
+            </a:r>
+            <a:r>
+              <a:rPr lang="en-US" b="1" dirty="0">
+                <a:latin typeface="Courier New" panose="02070309020205020404" pitchFamily="49" charset="0"/>
+                <a:cs typeface="Courier New" panose="02070309020205020404" pitchFamily="49" charset="0"/>
+              </a:rPr>
+              <a:t>("Hello World</a:t>
+            </a:r>
+            <a:r>
+              <a:rPr lang="en-US" b="1" dirty="0" smtClean="0">
+                <a:latin typeface="Courier New" panose="02070309020205020404" pitchFamily="49" charset="0"/>
+                <a:cs typeface="Courier New" panose="02070309020205020404" pitchFamily="49" charset="0"/>
+              </a:rPr>
+              <a:t>");</a:t>
+            </a:r>
+          </a:p>
+          <a:p>
+            <a:pPr marL="0" indent="0">
+              <a:buNone/>
+            </a:pPr>
+            <a:r>
+              <a:rPr lang="en-US" b="1" dirty="0" smtClean="0">
+                <a:latin typeface="Courier New" panose="02070309020205020404" pitchFamily="49" charset="0"/>
+                <a:cs typeface="Courier New" panose="02070309020205020404" pitchFamily="49" charset="0"/>
+              </a:rPr>
+              <a:t>alert("It worked!");</a:t>
+            </a:r>
+          </a:p>
+          <a:p>
+            <a:pPr marL="0" indent="0">
+              <a:buNone/>
+            </a:pPr>
+            <a:r>
+              <a:rPr lang="en-US" b="1" dirty="0" smtClean="0">
+                <a:latin typeface="Courier New" panose="02070309020205020404" pitchFamily="49" charset="0"/>
+                <a:cs typeface="Courier New" panose="02070309020205020404" pitchFamily="49" charset="0"/>
+              </a:rPr>
+              <a:t>&lt;/</a:t>
+            </a:r>
+            <a:r>
+              <a:rPr lang="en-US" b="1" dirty="0">
+                <a:latin typeface="Courier New" panose="02070309020205020404" pitchFamily="49" charset="0"/>
+                <a:cs typeface="Courier New" panose="02070309020205020404" pitchFamily="49" charset="0"/>
+              </a:rPr>
+              <a:t>script</a:t>
+            </a:r>
+            <a:r>
+              <a:rPr lang="en-US" b="1" dirty="0" smtClean="0">
+                <a:latin typeface="Courier New" panose="02070309020205020404" pitchFamily="49" charset="0"/>
+                <a:cs typeface="Courier New" panose="02070309020205020404" pitchFamily="49" charset="0"/>
+              </a:rPr>
+              <a:t>&gt;</a:t>
+            </a:r>
+          </a:p>
+          <a:p>
+            <a:pPr marL="0" indent="0">
+              <a:buNone/>
+            </a:pPr>
+            <a:r>
+              <a:rPr lang="en-US" dirty="0" smtClean="0">
+                <a:latin typeface="Courier New" panose="02070309020205020404" pitchFamily="49" charset="0"/>
+                <a:cs typeface="Courier New" panose="02070309020205020404" pitchFamily="49" charset="0"/>
+              </a:rPr>
+              <a:t>&lt;/h1&gt;</a:t>
+            </a:r>
+            <a:endParaRPr lang="en-US" dirty="0" smtClean="0">
+              <a:latin typeface="Courier New" panose="02070309020205020404" pitchFamily="49" charset="0"/>
+              <a:cs typeface="Courier New" panose="02070309020205020404" pitchFamily="49" charset="0"/>
+            </a:endParaRPr>
+          </a:p>
+          <a:p>
+            <a:pPr marL="0" indent="0">
+              <a:buNone/>
+            </a:pPr>
+            <a:r>
+              <a:rPr lang="en-US" dirty="0" smtClean="0">
+                <a:latin typeface="Courier New" panose="02070309020205020404" pitchFamily="49" charset="0"/>
+                <a:cs typeface="Courier New" panose="02070309020205020404" pitchFamily="49" charset="0"/>
+              </a:rPr>
+              <a:t>&lt;/body&gt;</a:t>
+            </a:r>
+          </a:p>
+          <a:p>
+            <a:pPr marL="0" indent="0">
+              <a:buNone/>
+            </a:pPr>
+            <a:r>
+              <a:rPr lang="en-US" dirty="0" smtClean="0">
+                <a:latin typeface="Courier New" panose="02070309020205020404" pitchFamily="49" charset="0"/>
+                <a:cs typeface="Courier New" panose="02070309020205020404" pitchFamily="49" charset="0"/>
+              </a:rPr>
+              <a:t>&lt;/html&gt;</a:t>
+            </a:r>
+            <a:endParaRPr lang="en-US" dirty="0">
+              <a:latin typeface="Courier New" panose="02070309020205020404" pitchFamily="49" charset="0"/>
+              <a:cs typeface="Courier New" panose="02070309020205020404" pitchFamily="49" charset="0"/>
+            </a:endParaRPr>
           </a:p>
         </p:txBody>
       </p:sp>
     </p:spTree>
     <p:extLst>
       <p:ext uri="{BB962C8B-B14F-4D97-AF65-F5344CB8AC3E}">
-        <p14:creationId xmlns:p14="http://schemas.microsoft.com/office/powerpoint/2010/main" val="1441364826"/>
+        <p14:creationId xmlns:p14="http://schemas.microsoft.com/office/powerpoint/2010/main" val="3746872012"/>
       </p:ext>
     </p:extLst>
   </p:cSld>
   <p:clrMapOvr>
     <a:masterClrMapping/>
   </p:clrMapOvr>
+  <p:timing>
+    <p:tnLst>
+      <p:par>
+        <p:cTn id="1" dur="indefinite" restart="never" nodeType="tmRoot"/>
+      </p:par>
+    </p:tnLst>
+  </p:timing>
 </p:sld>
 </file>
 
@@ -5264,66 +6089,112 @@
       </p:grpSpPr>
       <p:sp>
         <p:nvSpPr>
-          <p:cNvPr id="3" name="TextBox 2"/>
-          <p:cNvSpPr txBox="1"/>
-          <p:nvPr/>
-        </p:nvSpPr>
-        <p:spPr>
-          <a:xfrm>
-            <a:off x="1219200" y="2438400"/>
-            <a:ext cx="4099392" cy="923330"/>
-          </a:xfrm>
-          <a:prstGeom prst="rect">
-            <a:avLst/>
-          </a:prstGeom>
-          <a:noFill/>
-        </p:spPr>
-        <p:txBody>
-          <a:bodyPr wrap="none" rtlCol="0">
-            <a:spAutoFit/>
+          <p:cNvPr id="2" name="Title 1"/>
+          <p:cNvSpPr>
+            <a:spLocks noGrp="1"/>
+          </p:cNvSpPr>
+          <p:nvPr>
+            <p:ph type="title"/>
+          </p:nvPr>
+        </p:nvSpPr>
+        <p:spPr/>
+        <p:txBody>
+          <a:bodyPr/>
+          <a:lstStyle/>
+          <a:p>
+            <a:r>
+              <a:rPr lang="en-US" dirty="0" smtClean="0"/>
+              <a:t>Can you play?</a:t>
+            </a:r>
+            <a:endParaRPr lang="en-US" dirty="0"/>
+          </a:p>
+        </p:txBody>
+      </p:sp>
+      <p:sp>
+        <p:nvSpPr>
+          <p:cNvPr id="5" name="Content Placeholder 4"/>
+          <p:cNvSpPr>
+            <a:spLocks noGrp="1"/>
+          </p:cNvSpPr>
+          <p:nvPr>
+            <p:ph idx="1"/>
+          </p:nvPr>
+        </p:nvSpPr>
+        <p:spPr/>
+        <p:txBody>
+          <a:bodyPr>
+            <a:normAutofit fontScale="92500" lnSpcReduction="10000"/>
           </a:bodyPr>
           <a:lstStyle/>
           <a:p>
             <a:r>
               <a:rPr lang="en-US" dirty="0" smtClean="0"/>
-              <a:t>Widgets/template editors</a:t>
-            </a:r>
-          </a:p>
-          <a:p>
-            <a:r>
-              <a:rPr lang="en-US" dirty="0" smtClean="0"/>
-              <a:t>Existing JavaScript functions and variables</a:t>
-            </a:r>
-          </a:p>
-          <a:p>
-            <a:r>
-              <a:rPr lang="en-US" dirty="0" smtClean="0"/>
-              <a:t>Libraries (jQuery)</a:t>
-            </a:r>
-            <a:endParaRPr lang="en-US" dirty="0"/>
-          </a:p>
-        </p:txBody>
-      </p:sp>
-      <p:sp>
-        <p:nvSpPr>
-          <p:cNvPr id="2" name="Title 1"/>
-          <p:cNvSpPr>
-            <a:spLocks noGrp="1"/>
-          </p:cNvSpPr>
-          <p:nvPr>
-            <p:ph type="title"/>
-          </p:nvPr>
-        </p:nvSpPr>
-        <p:spPr/>
-        <p:txBody>
-          <a:bodyPr>
-            <a:normAutofit/>
-          </a:bodyPr>
-          <a:lstStyle/>
-          <a:p>
-            <a:r>
-              <a:rPr lang="en-US" dirty="0" smtClean="0"/>
-              <a:t>What do you have to play with?</a:t>
+              <a:t>Need to get &lt;script&gt; code into the HTML</a:t>
+            </a:r>
+          </a:p>
+          <a:p>
+            <a:r>
+              <a:rPr lang="en-US" dirty="0" smtClean="0"/>
+              <a:t>Probably cannot access &lt;head&gt; section</a:t>
+            </a:r>
+          </a:p>
+          <a:p>
+            <a:r>
+              <a:rPr lang="en-US" dirty="0" smtClean="0"/>
+              <a:t>Check documentation/support</a:t>
+            </a:r>
+          </a:p>
+          <a:p>
+            <a:r>
+              <a:rPr lang="en-US" dirty="0" smtClean="0"/>
+              <a:t>Rich text editor with HTML editing</a:t>
+            </a:r>
+          </a:p>
+          <a:p>
+            <a:r>
+              <a:rPr lang="en-US" dirty="0" smtClean="0"/>
+              <a:t>Custom HTML editor</a:t>
+            </a:r>
+          </a:p>
+          <a:p>
+            <a:r>
+              <a:rPr lang="en-US" dirty="0" smtClean="0"/>
+              <a:t>Put in a new page and try it (test version?)</a:t>
+            </a:r>
+          </a:p>
+          <a:p>
+            <a:r>
+              <a:rPr lang="en-US" dirty="0" smtClean="0"/>
+              <a:t>Does it display?</a:t>
+            </a:r>
+          </a:p>
+          <a:p>
+            <a:r>
+              <a:rPr lang="en-US" dirty="0" smtClean="0"/>
+              <a:t>Does it cause an error?</a:t>
+            </a:r>
+            <a:br>
+              <a:rPr lang="en-US" dirty="0" smtClean="0"/>
+            </a:br>
+            <a:r>
+              <a:rPr lang="en-US" sz="2200" dirty="0"/>
+              <a:t>demo – </a:t>
+            </a:r>
+            <a:r>
+              <a:rPr lang="en-US" sz="2200" dirty="0">
+                <a:hlinkClick r:id="rId2"/>
+              </a:rPr>
+              <a:t>http://</a:t>
+            </a:r>
+            <a:r>
+              <a:rPr lang="en-US" sz="2200" dirty="0" smtClean="0">
+                <a:hlinkClick r:id="rId2"/>
+              </a:rPr>
+              <a:t>www.anokacount.us/tryit</a:t>
+            </a:r>
+            <a:r>
+              <a:rPr lang="en-US" dirty="0" smtClean="0"/>
+              <a:t> </a:t>
             </a:r>
             <a:endParaRPr lang="en-US" dirty="0"/>
           </a:p>
@@ -5332,20 +6203,13 @@
     </p:spTree>
     <p:extLst>
       <p:ext uri="{BB962C8B-B14F-4D97-AF65-F5344CB8AC3E}">
-        <p14:creationId xmlns:p14="http://schemas.microsoft.com/office/powerpoint/2010/main" val="3049985624"/>
+        <p14:creationId xmlns:p14="http://schemas.microsoft.com/office/powerpoint/2010/main" val="2311885351"/>
       </p:ext>
     </p:extLst>
   </p:cSld>
   <p:clrMapOvr>
     <a:masterClrMapping/>
   </p:clrMapOvr>
-  <p:timing>
-    <p:tnLst>
-      <p:par>
-        <p:cTn id="1" dur="indefinite" restart="never" nodeType="tmRoot"/>
-      </p:par>
-    </p:tnLst>
-  </p:timing>
 </p:sld>
 </file>
 

</xml_diff>